<commit_message>
Presentation Final Version updated
</commit_message>
<xml_diff>
--- a/docs/발표자료_주석.pptx
+++ b/docs/발표자료_주석.pptx
@@ -5,10 +5,10 @@
     <p:sldMasterId id="2147483660" r:id="rId1"/>
   </p:sldMasterIdLst>
   <p:notesMasterIdLst>
-    <p:notesMasterId r:id="rId18"/>
+    <p:notesMasterId r:id="rId19"/>
   </p:notesMasterIdLst>
   <p:handoutMasterIdLst>
-    <p:handoutMasterId r:id="rId19"/>
+    <p:handoutMasterId r:id="rId20"/>
   </p:handoutMasterIdLst>
   <p:sldIdLst>
     <p:sldId id="256" r:id="rId2"/>
@@ -21,12 +21,13 @@
     <p:sldId id="271" r:id="rId9"/>
     <p:sldId id="261" r:id="rId10"/>
     <p:sldId id="266" r:id="rId11"/>
-    <p:sldId id="258" r:id="rId12"/>
-    <p:sldId id="263" r:id="rId13"/>
-    <p:sldId id="265" r:id="rId14"/>
-    <p:sldId id="264" r:id="rId15"/>
-    <p:sldId id="272" r:id="rId16"/>
-    <p:sldId id="273" r:id="rId17"/>
+    <p:sldId id="263" r:id="rId12"/>
+    <p:sldId id="265" r:id="rId13"/>
+    <p:sldId id="258" r:id="rId14"/>
+    <p:sldId id="274" r:id="rId15"/>
+    <p:sldId id="264" r:id="rId16"/>
+    <p:sldId id="272" r:id="rId17"/>
+    <p:sldId id="273" r:id="rId18"/>
   </p:sldIdLst>
   <p:sldSz cx="9144000" cy="6858000" type="screen4x3"/>
   <p:notesSz cx="6858000" cy="9144000"/>
@@ -210,7 +211,7 @@
           <a:p>
             <a:fld id="{F3A6DB16-28FB-4CEA-9094-E65028644022}" type="datetimeFigureOut">
               <a:rPr lang="ko-KR" altLang="en-US" smtClean="0"/>
-              <a:t>12. 2. 2.</a:t>
+              <a:t>12. 2. 3.</a:t>
             </a:fld>
             <a:endParaRPr lang="ko-KR" altLang="en-US"/>
           </a:p>
@@ -376,7 +377,7 @@
           <a:p>
             <a:fld id="{4A91D267-B320-4105-AF60-E700C4D7049B}" type="datetimeFigureOut">
               <a:rPr lang="ko-KR" altLang="en-US" smtClean="0"/>
-              <a:t>12. 2. 2.</a:t>
+              <a:t>12. 2. 3.</a:t>
             </a:fld>
             <a:endParaRPr lang="ko-KR" altLang="en-US"/>
           </a:p>
@@ -709,19 +710,7 @@
           <a:p>
             <a:r>
               <a:rPr lang="en-US" baseline="0" dirty="0" smtClean="0"/>
-              <a:t>We </a:t>
-            </a:r>
-            <a:r>
-              <a:rPr lang="en-US" baseline="0" dirty="0" smtClean="0"/>
-              <a:t>ran this project, sector level mapping </a:t>
-            </a:r>
-            <a:r>
-              <a:rPr lang="en-US" baseline="0" dirty="0" smtClean="0"/>
-              <a:t>FTL </a:t>
-            </a:r>
-            <a:r>
-              <a:rPr lang="en-US" baseline="0" dirty="0" smtClean="0"/>
-              <a:t>based on </a:t>
+              <a:t>We ran this project, sector level mapping FTL based on </a:t>
             </a:r>
             <a:r>
               <a:rPr lang="en-US" baseline="0" dirty="0" err="1" smtClean="0"/>
@@ -729,11 +718,7 @@
             </a:r>
             <a:r>
               <a:rPr lang="en-US" baseline="0" dirty="0" smtClean="0"/>
-              <a:t> </a:t>
-            </a:r>
-            <a:r>
-              <a:rPr lang="en-US" baseline="0" dirty="0" smtClean="0"/>
-              <a:t>Platform, for a month.</a:t>
+              <a:t> Platform, for a month.</a:t>
             </a:r>
             <a:endParaRPr lang="en-US" dirty="0"/>
           </a:p>
@@ -950,22 +935,16 @@
           <a:lstStyle/>
           <a:p>
             <a:r>
-              <a:rPr lang="en-US" baseline="0" dirty="0" smtClean="0"/>
-              <a:t>In random write test, these are IOPS of each FTLs.</a:t>
-            </a:r>
-          </a:p>
-          <a:p>
-            <a:r>
-              <a:rPr lang="en-US" baseline="0" dirty="0" smtClean="0"/>
-              <a:t>1_buffer, dynamic, static, </a:t>
-            </a:r>
-            <a:r>
-              <a:rPr lang="en-US" baseline="0" dirty="0" err="1" smtClean="0"/>
-              <a:t>multi_copy</a:t>
-            </a:r>
-            <a:r>
-              <a:rPr lang="en-US" baseline="0" dirty="0" smtClean="0"/>
-              <a:t> is sector level mapping FTLs, but tutorial 1, greedy is page level mapping FTLs.</a:t>
+              <a:rPr lang="en-US" altLang="ko-KR" dirty="0" smtClean="0"/>
+              <a:t>In 64GB random write</a:t>
+            </a:r>
+            <a:r>
+              <a:rPr lang="en-US" altLang="ko-KR" baseline="0" dirty="0" smtClean="0"/>
+              <a:t> experiment</a:t>
+            </a:r>
+            <a:r>
+              <a:rPr lang="en-US" altLang="ko-KR" baseline="0" dirty="0" smtClean="0"/>
+              <a:t>.</a:t>
             </a:r>
           </a:p>
           <a:p>
@@ -988,32 +967,17 @@
             </a:pPr>
             <a:r>
               <a:rPr lang="en-US" baseline="0" dirty="0" smtClean="0"/>
-              <a:t>In 512Bytes, four sector level FTLs shown about 20000 IOPS, but two page level FTLs shown about only 2400, 1600 IOPS.</a:t>
-            </a:r>
-          </a:p>
-          <a:p>
-            <a:pPr marL="0" marR="0" indent="0" algn="l" defTabSz="914400" rtl="0" eaLnBrk="1" fontAlgn="auto" latinLnBrk="1" hangingPunct="1">
-              <a:lnSpc>
-                <a:spcPct val="100000"/>
-              </a:lnSpc>
-              <a:spcBef>
-                <a:spcPts val="0"/>
-              </a:spcBef>
-              <a:spcAft>
-                <a:spcPts val="0"/>
-              </a:spcAft>
-              <a:buClrTx/>
-              <a:buSzTx/>
-              <a:buFontTx/>
-              <a:buNone/>
-              <a:tabLst/>
-              <a:defRPr/>
-            </a:pPr>
+              <a:t>1_buffer, dynamic, static, </a:t>
+            </a:r>
+            <a:r>
+              <a:rPr lang="en-US" baseline="0" dirty="0" err="1" smtClean="0"/>
+              <a:t>multi_copy</a:t>
+            </a:r>
             <a:r>
               <a:rPr lang="en-US" baseline="0" dirty="0" smtClean="0"/>
-              <a:t>It is 10 times difference.</a:t>
-            </a:r>
-            <a:endParaRPr lang="en-US" baseline="0" dirty="0" smtClean="0"/>
+              <a:t> is sector level mapping FTLs, but tutorial 1, greedy is page level mapping FTLs.</a:t>
+            </a:r>
+            <a:endParaRPr lang="en-US" altLang="ko-KR" baseline="0" dirty="0" smtClean="0"/>
           </a:p>
           <a:p>
             <a:r>
@@ -1022,7 +986,17 @@
             </a:r>
             <a:r>
               <a:rPr lang="en-US" baseline="0" dirty="0" smtClean="0"/>
-              <a:t> level FTLs has greater random write performance than page level FTLs.</a:t>
+              <a:t> mapping FTLs has greater random write IOPS than page mapping FTLs.</a:t>
+            </a:r>
+          </a:p>
+          <a:p>
+            <a:r>
+              <a:rPr lang="en-US" dirty="0" smtClean="0"/>
+              <a:t>It is because in</a:t>
+            </a:r>
+            <a:r>
+              <a:rPr lang="en-US" baseline="0" dirty="0" smtClean="0"/>
+              <a:t> small random write, page mapping FTLs waste more spaces than sector mapping FTLs.</a:t>
             </a:r>
           </a:p>
           <a:p>
@@ -1031,11 +1005,8 @@
           <a:p>
             <a:r>
               <a:rPr lang="en-US" baseline="0" dirty="0" smtClean="0"/>
-              <a:t>In sequential test, write speed and read speed of sector level FTLs are about 8 times slower than page level FTLs.</a:t>
-            </a:r>
-          </a:p>
-          <a:p>
-            <a:endParaRPr lang="en-US" baseline="0" dirty="0" smtClean="0"/>
+              <a:t>(But especially, Multi-copy FTL puts succeeding sectors at once, so the performance drop is shown by transfer size increase.)</a:t>
+            </a:r>
           </a:p>
         </p:txBody>
       </p:sp>
@@ -1065,7 +1036,7 @@
     </p:spTree>
     <p:extLst>
       <p:ext uri="{BB962C8B-B14F-4D97-AF65-F5344CB8AC3E}">
-        <p14:creationId xmlns:p14="http://schemas.microsoft.com/office/powerpoint/2010/main" val="2880351047"/>
+        <p14:creationId xmlns:p14="http://schemas.microsoft.com/office/powerpoint/2010/main" val="3702278434"/>
       </p:ext>
     </p:extLst>
   </p:cSld>
@@ -1120,50 +1091,51 @@
           <a:lstStyle/>
           <a:p>
             <a:r>
-              <a:rPr lang="en-US" altLang="ko-KR" dirty="0" smtClean="0"/>
-              <a:t>In 64GB random write</a:t>
-            </a:r>
-            <a:r>
-              <a:rPr lang="en-US" altLang="ko-KR" baseline="0" dirty="0" smtClean="0"/>
-              <a:t> experiment.</a:t>
-            </a:r>
-          </a:p>
-          <a:p>
-            <a:r>
               <a:rPr lang="en-US" dirty="0" smtClean="0"/>
-              <a:t>Sector</a:t>
+              <a:t>In 64GB sequential</a:t>
             </a:r>
             <a:r>
               <a:rPr lang="en-US" baseline="0" dirty="0" smtClean="0"/>
-              <a:t> mapping FTLs has greater random write IOPS than page mapping FTLs.</a:t>
+              <a:t> write and read experiment,</a:t>
             </a:r>
           </a:p>
           <a:p>
             <a:r>
               <a:rPr lang="en-US" dirty="0" smtClean="0"/>
-              <a:t>It is because in</a:t>
+              <a:t>Sector mapping FTLs</a:t>
             </a:r>
             <a:r>
               <a:rPr lang="en-US" baseline="0" dirty="0" smtClean="0"/>
-              <a:t> small random write, page mapping FTLs waste more spaces than sector mapping FTLs.</a:t>
-            </a:r>
-          </a:p>
-          <a:p>
-            <a:endParaRPr lang="en-US" baseline="0" dirty="0" smtClean="0"/>
-          </a:p>
-          <a:p>
+              <a:t> has worse sequential performance than page mapping FTLs.</a:t>
+            </a:r>
+          </a:p>
+          <a:p>
+            <a:r>
+              <a:rPr lang="en-US" dirty="0" smtClean="0"/>
+              <a:t>It is</a:t>
+            </a:r>
             <a:r>
               <a:rPr lang="en-US" baseline="0" dirty="0" smtClean="0"/>
-              <a:t>(But especially, Multi-copy FTL puts succeeding sectors at once, so the performance drop </a:t>
+              <a:t> because in sequential write and read, mapping table access overhead of sector mapping FTLs is more than page mapping FTLs.</a:t>
+            </a:r>
+          </a:p>
+          <a:p>
+            <a:endParaRPr lang="en-US" dirty="0" smtClean="0"/>
+          </a:p>
+          <a:p>
+            <a:r>
+              <a:rPr lang="en-US" dirty="0" smtClean="0"/>
+              <a:t>(Especially,</a:t>
             </a:r>
             <a:r>
               <a:rPr lang="en-US" baseline="0" dirty="0" smtClean="0"/>
-              <a:t>is shown by transfer size increase.</a:t>
-            </a:r>
-            <a:r>
-              <a:rPr lang="en-US" baseline="0" dirty="0" smtClean="0"/>
-              <a:t>)</a:t>
-            </a:r>
+              <a:t> dynamic and static </a:t>
+            </a:r>
+            <a:r>
+              <a:rPr lang="en-US" baseline="0" smtClean="0"/>
+              <a:t>FTLs can )</a:t>
+            </a:r>
+            <a:endParaRPr lang="en-US" dirty="0"/>
           </a:p>
         </p:txBody>
       </p:sp>
@@ -1193,7 +1165,7 @@
     </p:spTree>
     <p:extLst>
       <p:ext uri="{BB962C8B-B14F-4D97-AF65-F5344CB8AC3E}">
-        <p14:creationId xmlns:p14="http://schemas.microsoft.com/office/powerpoint/2010/main" val="3702278434"/>
+        <p14:creationId xmlns:p14="http://schemas.microsoft.com/office/powerpoint/2010/main" val="1042723089"/>
       </p:ext>
     </p:extLst>
   </p:cSld>
@@ -1248,63 +1220,81 @@
           <a:lstStyle/>
           <a:p>
             <a:r>
+              <a:rPr lang="en-US" baseline="0" dirty="0" smtClean="0"/>
+              <a:t>In random write test, these are IOPS of each FTLs.</a:t>
+            </a:r>
+          </a:p>
+          <a:p>
+            <a:pPr marL="0" marR="0" indent="0" algn="l" defTabSz="914400" rtl="0" eaLnBrk="1" fontAlgn="auto" latinLnBrk="1" hangingPunct="1">
+              <a:lnSpc>
+                <a:spcPct val="100000"/>
+              </a:lnSpc>
+              <a:spcBef>
+                <a:spcPts val="0"/>
+              </a:spcBef>
+              <a:spcAft>
+                <a:spcPts val="0"/>
+              </a:spcAft>
+              <a:buClrTx/>
+              <a:buSzTx/>
+              <a:buFontTx/>
+              <a:buNone/>
+              <a:tabLst/>
+              <a:defRPr/>
+            </a:pPr>
+            <a:r>
+              <a:rPr lang="en-US" baseline="0" dirty="0" smtClean="0"/>
+              <a:t>In </a:t>
+            </a:r>
+            <a:r>
+              <a:rPr lang="en-US" baseline="0" dirty="0" smtClean="0"/>
+              <a:t>512Bytes, four sector level FTLs shown about 20000 IOPS, but two page level FTLs shown about only 2400, 1600 IOPS.</a:t>
+            </a:r>
+          </a:p>
+          <a:p>
+            <a:pPr marL="0" marR="0" indent="0" algn="l" defTabSz="914400" rtl="0" eaLnBrk="1" fontAlgn="auto" latinLnBrk="1" hangingPunct="1">
+              <a:lnSpc>
+                <a:spcPct val="100000"/>
+              </a:lnSpc>
+              <a:spcBef>
+                <a:spcPts val="0"/>
+              </a:spcBef>
+              <a:spcAft>
+                <a:spcPts val="0"/>
+              </a:spcAft>
+              <a:buClrTx/>
+              <a:buSzTx/>
+              <a:buFontTx/>
+              <a:buNone/>
+              <a:tabLst/>
+              <a:defRPr/>
+            </a:pPr>
+            <a:r>
+              <a:rPr lang="en-US" baseline="0" dirty="0" smtClean="0"/>
+              <a:t>It is 10 times difference.</a:t>
+            </a:r>
+          </a:p>
+          <a:p>
+            <a:r>
               <a:rPr lang="en-US" dirty="0" smtClean="0"/>
-              <a:t>In 64GB sequential</a:t>
+              <a:t>Sector</a:t>
             </a:r>
             <a:r>
               <a:rPr lang="en-US" baseline="0" dirty="0" smtClean="0"/>
-              <a:t> write and read experiment,</a:t>
-            </a:r>
-          </a:p>
-          <a:p>
-            <a:r>
-              <a:rPr lang="en-US" dirty="0" smtClean="0"/>
-              <a:t>Sector mapping FTLs</a:t>
-            </a:r>
+              <a:t> level FTLs has greater random write performance than page level FTLs.</a:t>
+            </a:r>
+          </a:p>
+          <a:p>
+            <a:endParaRPr lang="en-US" baseline="0" dirty="0" smtClean="0"/>
+          </a:p>
+          <a:p>
             <a:r>
               <a:rPr lang="en-US" baseline="0" dirty="0" smtClean="0"/>
-              <a:t> has worse sequential performance t</a:t>
-            </a:r>
-            <a:r>
-              <a:rPr lang="en-US" baseline="0" dirty="0" smtClean="0"/>
-              <a:t>han page mapping FTLs.</a:t>
-            </a:r>
-          </a:p>
-          <a:p>
-            <a:r>
-              <a:rPr lang="en-US" dirty="0" smtClean="0"/>
-              <a:t>It</a:t>
-            </a:r>
-            <a:r>
-              <a:rPr lang="en-US" dirty="0" smtClean="0"/>
-              <a:t> </a:t>
-            </a:r>
-            <a:r>
-              <a:rPr lang="en-US" dirty="0" smtClean="0"/>
-              <a:t>is</a:t>
-            </a:r>
-            <a:r>
-              <a:rPr lang="en-US" baseline="0" dirty="0" smtClean="0"/>
-              <a:t> because in sequential write and read, mapping table access overhead of sector mapping FTLs is more than page mapping FTLs.</a:t>
-            </a:r>
-          </a:p>
-          <a:p>
-            <a:endParaRPr lang="en-US" dirty="0" smtClean="0"/>
-          </a:p>
-          <a:p>
-            <a:r>
-              <a:rPr lang="en-US" dirty="0" smtClean="0"/>
-              <a:t>(Especially,</a:t>
-            </a:r>
-            <a:r>
-              <a:rPr lang="en-US" baseline="0" dirty="0" smtClean="0"/>
-              <a:t> dynamic and static </a:t>
-            </a:r>
-            <a:r>
-              <a:rPr lang="en-US" baseline="0" smtClean="0"/>
-              <a:t>FTLs can )</a:t>
-            </a:r>
-            <a:endParaRPr lang="en-US" dirty="0"/>
+              <a:t>In sequential test, write speed and read speed of sector level FTLs are about 8 times slower than page level FTLs.</a:t>
+            </a:r>
+          </a:p>
+          <a:p>
+            <a:endParaRPr lang="en-US" baseline="0" dirty="0" smtClean="0"/>
           </a:p>
         </p:txBody>
       </p:sp>
@@ -1334,7 +1324,7 @@
     </p:spTree>
     <p:extLst>
       <p:ext uri="{BB962C8B-B14F-4D97-AF65-F5344CB8AC3E}">
-        <p14:creationId xmlns:p14="http://schemas.microsoft.com/office/powerpoint/2010/main" val="1042723089"/>
+        <p14:creationId xmlns:p14="http://schemas.microsoft.com/office/powerpoint/2010/main" val="2880351047"/>
       </p:ext>
     </p:extLst>
   </p:cSld>
@@ -1389,12 +1379,78 @@
           <a:lstStyle/>
           <a:p>
             <a:r>
+              <a:rPr lang="en-US" baseline="0" dirty="0" smtClean="0"/>
+              <a:t>In random write test, these are IOPS of each FTLs.</a:t>
+            </a:r>
+          </a:p>
+          <a:p>
+            <a:r>
+              <a:rPr lang="en-US" baseline="0" dirty="0" smtClean="0"/>
+              <a:t>1_buffer, dynamic, static, </a:t>
+            </a:r>
+            <a:r>
+              <a:rPr lang="en-US" baseline="0" dirty="0" err="1" smtClean="0"/>
+              <a:t>multi_copy</a:t>
+            </a:r>
+            <a:r>
+              <a:rPr lang="en-US" baseline="0" dirty="0" smtClean="0"/>
+              <a:t> is sector level mapping FTLs, but tutorial 1, greedy is page level mapping FTLs.</a:t>
+            </a:r>
+          </a:p>
+          <a:p>
+            <a:pPr marL="0" marR="0" indent="0" algn="l" defTabSz="914400" rtl="0" eaLnBrk="1" fontAlgn="auto" latinLnBrk="1" hangingPunct="1">
+              <a:lnSpc>
+                <a:spcPct val="100000"/>
+              </a:lnSpc>
+              <a:spcBef>
+                <a:spcPts val="0"/>
+              </a:spcBef>
+              <a:spcAft>
+                <a:spcPts val="0"/>
+              </a:spcAft>
+              <a:buClrTx/>
+              <a:buSzTx/>
+              <a:buFontTx/>
+              <a:buNone/>
+              <a:tabLst/>
+              <a:defRPr/>
+            </a:pPr>
+            <a:r>
+              <a:rPr lang="en-US" baseline="0" dirty="0" smtClean="0"/>
+              <a:t>In 512Bytes, four sector level FTLs shown about 20000 IOPS, but two page level FTLs shown about only 2400, 1600 IOPS.</a:t>
+            </a:r>
+          </a:p>
+          <a:p>
+            <a:pPr marL="0" marR="0" indent="0" algn="l" defTabSz="914400" rtl="0" eaLnBrk="1" fontAlgn="auto" latinLnBrk="1" hangingPunct="1">
+              <a:lnSpc>
+                <a:spcPct val="100000"/>
+              </a:lnSpc>
+              <a:spcBef>
+                <a:spcPts val="0"/>
+              </a:spcBef>
+              <a:spcAft>
+                <a:spcPts val="0"/>
+              </a:spcAft>
+              <a:buClrTx/>
+              <a:buSzTx/>
+              <a:buFontTx/>
+              <a:buNone/>
+              <a:tabLst/>
+              <a:defRPr/>
+            </a:pPr>
+            <a:r>
+              <a:rPr lang="en-US" baseline="0" dirty="0" smtClean="0"/>
+              <a:t>It is 10 times difference.</a:t>
+            </a:r>
+          </a:p>
+          <a:p>
+            <a:r>
               <a:rPr lang="en-US" dirty="0" smtClean="0"/>
-              <a:t>These</a:t>
+              <a:t>Sector</a:t>
             </a:r>
             <a:r>
               <a:rPr lang="en-US" baseline="0" dirty="0" smtClean="0"/>
-              <a:t> are our conclusion.</a:t>
+              <a:t> level FTLs has greater random write performance than page level FTLs.</a:t>
             </a:r>
           </a:p>
           <a:p>
@@ -1402,22 +1458,12 @@
           </a:p>
           <a:p>
             <a:r>
-              <a:rPr lang="en-US" altLang="ko-KR" dirty="0" smtClean="0"/>
-              <a:t>Small random write performance of sector mapping is GREAT!</a:t>
-            </a:r>
-          </a:p>
-          <a:p>
-            <a:r>
-              <a:rPr lang="en-US" altLang="ko-KR" dirty="0" smtClean="0"/>
-              <a:t>Sequential read/write performance of sector mapping is LOW…</a:t>
-            </a:r>
-          </a:p>
-          <a:p>
-            <a:r>
-              <a:rPr lang="en-US" altLang="ko-KR" dirty="0" smtClean="0"/>
-              <a:t>Shrinking mapping table OVERHEAD is important.</a:t>
-            </a:r>
-            <a:endParaRPr lang="en-US" dirty="0"/>
+              <a:rPr lang="en-US" baseline="0" dirty="0" smtClean="0"/>
+              <a:t>In sequential test, write speed and read speed of sector level FTLs are about 8 times slower than page level FTLs.</a:t>
+            </a:r>
+          </a:p>
+          <a:p>
+            <a:endParaRPr lang="en-US" baseline="0" dirty="0" smtClean="0"/>
           </a:p>
         </p:txBody>
       </p:sp>
@@ -1447,7 +1493,7 @@
     </p:spTree>
     <p:extLst>
       <p:ext uri="{BB962C8B-B14F-4D97-AF65-F5344CB8AC3E}">
-        <p14:creationId xmlns:p14="http://schemas.microsoft.com/office/powerpoint/2010/main" val="3521209351"/>
+        <p14:creationId xmlns:p14="http://schemas.microsoft.com/office/powerpoint/2010/main" val="2880351047"/>
       </p:ext>
     </p:extLst>
   </p:cSld>
@@ -1507,7 +1553,28 @@
             </a:r>
             <a:r>
               <a:rPr lang="en-US" baseline="0" dirty="0" smtClean="0"/>
-              <a:t> are our references.</a:t>
+              <a:t> are our conclusion.</a:t>
+            </a:r>
+          </a:p>
+          <a:p>
+            <a:endParaRPr lang="en-US" baseline="0" dirty="0" smtClean="0"/>
+          </a:p>
+          <a:p>
+            <a:r>
+              <a:rPr lang="en-US" altLang="ko-KR" dirty="0" smtClean="0"/>
+              <a:t>Small random write performance of sector mapping is GREAT!</a:t>
+            </a:r>
+          </a:p>
+          <a:p>
+            <a:r>
+              <a:rPr lang="en-US" altLang="ko-KR" dirty="0" smtClean="0"/>
+              <a:t>Sequential read/write performance of sector mapping is LOW…</a:t>
+            </a:r>
+          </a:p>
+          <a:p>
+            <a:r>
+              <a:rPr lang="en-US" altLang="ko-KR" dirty="0" smtClean="0"/>
+              <a:t>Shrinking mapping table OVERHEAD is important.</a:t>
             </a:r>
             <a:endParaRPr lang="en-US" dirty="0"/>
           </a:p>
@@ -1539,7 +1606,7 @@
     </p:spTree>
     <p:extLst>
       <p:ext uri="{BB962C8B-B14F-4D97-AF65-F5344CB8AC3E}">
-        <p14:creationId xmlns:p14="http://schemas.microsoft.com/office/powerpoint/2010/main" val="2998650093"/>
+        <p14:creationId xmlns:p14="http://schemas.microsoft.com/office/powerpoint/2010/main" val="3521209351"/>
       </p:ext>
     </p:extLst>
   </p:cSld>
@@ -1595,11 +1662,11 @@
           <a:p>
             <a:r>
               <a:rPr lang="en-US" dirty="0" smtClean="0"/>
-              <a:t>There</a:t>
+              <a:t>These</a:t>
             </a:r>
             <a:r>
               <a:rPr lang="en-US" baseline="0" dirty="0" smtClean="0"/>
-              <a:t> is any question?</a:t>
+              <a:t> are our references.</a:t>
             </a:r>
             <a:endParaRPr lang="en-US" dirty="0"/>
           </a:p>
@@ -1623,6 +1690,98 @@
             <a:fld id="{0550A5A0-F819-44EF-B807-DF5E4C60908A}" type="slidenum">
               <a:rPr lang="ko-KR" altLang="en-US" smtClean="0"/>
               <a:t>16</a:t>
+            </a:fld>
+            <a:endParaRPr lang="ko-KR" altLang="en-US" dirty="0"/>
+          </a:p>
+        </p:txBody>
+      </p:sp>
+    </p:spTree>
+    <p:extLst>
+      <p:ext uri="{BB962C8B-B14F-4D97-AF65-F5344CB8AC3E}">
+        <p14:creationId xmlns:p14="http://schemas.microsoft.com/office/powerpoint/2010/main" val="2998650093"/>
+      </p:ext>
+    </p:extLst>
+  </p:cSld>
+  <p:clrMapOvr>
+    <a:masterClrMapping/>
+  </p:clrMapOvr>
+</p:notes>
+</file>
+
+<file path=ppt/notesSlides/notesSlide17.xml><?xml version="1.0" encoding="utf-8"?>
+<p:notes xmlns:a="http://schemas.openxmlformats.org/drawingml/2006/main" xmlns:r="http://schemas.openxmlformats.org/officeDocument/2006/relationships" xmlns:p="http://schemas.openxmlformats.org/presentationml/2006/main">
+  <p:cSld>
+    <p:spTree>
+      <p:nvGrpSpPr>
+        <p:cNvPr id="1" name=""/>
+        <p:cNvGrpSpPr/>
+        <p:nvPr/>
+      </p:nvGrpSpPr>
+      <p:grpSpPr>
+        <a:xfrm>
+          <a:off x="0" y="0"/>
+          <a:ext cx="0" cy="0"/>
+          <a:chOff x="0" y="0"/>
+          <a:chExt cx="0" cy="0"/>
+        </a:xfrm>
+      </p:grpSpPr>
+      <p:sp>
+        <p:nvSpPr>
+          <p:cNvPr id="2" name="Slide Image Placeholder 1"/>
+          <p:cNvSpPr>
+            <a:spLocks noGrp="1" noRot="1" noChangeAspect="1"/>
+          </p:cNvSpPr>
+          <p:nvPr>
+            <p:ph type="sldImg"/>
+          </p:nvPr>
+        </p:nvSpPr>
+        <p:spPr/>
+      </p:sp>
+      <p:sp>
+        <p:nvSpPr>
+          <p:cNvPr id="3" name="Notes Placeholder 2"/>
+          <p:cNvSpPr>
+            <a:spLocks noGrp="1"/>
+          </p:cNvSpPr>
+          <p:nvPr>
+            <p:ph type="body" idx="1"/>
+          </p:nvPr>
+        </p:nvSpPr>
+        <p:spPr/>
+        <p:txBody>
+          <a:bodyPr/>
+          <a:lstStyle/>
+          <a:p>
+            <a:r>
+              <a:rPr lang="en-US" dirty="0" smtClean="0"/>
+              <a:t>There</a:t>
+            </a:r>
+            <a:r>
+              <a:rPr lang="en-US" baseline="0" dirty="0" smtClean="0"/>
+              <a:t> is any question?</a:t>
+            </a:r>
+            <a:endParaRPr lang="en-US" dirty="0"/>
+          </a:p>
+        </p:txBody>
+      </p:sp>
+      <p:sp>
+        <p:nvSpPr>
+          <p:cNvPr id="4" name="Slide Number Placeholder 3"/>
+          <p:cNvSpPr>
+            <a:spLocks noGrp="1"/>
+          </p:cNvSpPr>
+          <p:nvPr>
+            <p:ph type="sldNum" sz="quarter" idx="10"/>
+          </p:nvPr>
+        </p:nvSpPr>
+        <p:spPr/>
+        <p:txBody>
+          <a:bodyPr/>
+          <a:lstStyle/>
+          <a:p>
+            <a:fld id="{0550A5A0-F819-44EF-B807-DF5E4C60908A}" type="slidenum">
+              <a:rPr lang="ko-KR" altLang="en-US" smtClean="0"/>
+              <a:t>17</a:t>
             </a:fld>
             <a:endParaRPr lang="ko-KR" altLang="en-US" dirty="0"/>
           </a:p>
@@ -1691,51 +1850,39 @@
             </a:r>
             <a:r>
               <a:rPr lang="en-US" baseline="0" dirty="0" smtClean="0"/>
-              <a:t> will talk about </a:t>
+              <a:t> will talk about sector level </a:t>
             </a:r>
             <a:r>
               <a:rPr lang="en-US" baseline="0" dirty="0" smtClean="0"/>
-              <a:t>sector </a:t>
+              <a:t>mapping,</a:t>
+            </a:r>
+            <a:r>
+              <a:rPr lang="ko-KR" altLang="en-US" baseline="0" dirty="0" smtClean="0"/>
+              <a:t> </a:t>
+            </a:r>
+            <a:r>
+              <a:rPr lang="en-US" altLang="ko-KR" baseline="0" dirty="0" smtClean="0"/>
+              <a:t>and</a:t>
             </a:r>
             <a:r>
               <a:rPr lang="en-US" baseline="0" dirty="0" smtClean="0"/>
-              <a:t>level mapping</a:t>
+              <a:t> </a:t>
             </a:r>
             <a:r>
               <a:rPr lang="en-US" baseline="0" dirty="0" smtClean="0"/>
-              <a:t>, considerations about it.</a:t>
+              <a:t>considerations about it.</a:t>
             </a:r>
           </a:p>
           <a:p>
             <a:r>
               <a:rPr lang="en-US" baseline="0" dirty="0" smtClean="0"/>
-              <a:t>And I will talk about write </a:t>
-            </a:r>
+              <a:t>And I will talk about write module, read module for sector level mapping.</a:t>
+            </a:r>
+          </a:p>
+          <a:p>
             <a:r>
               <a:rPr lang="en-US" baseline="0" dirty="0" smtClean="0"/>
-              <a:t>module, read </a:t>
-            </a:r>
-            <a:r>
-              <a:rPr lang="en-US" baseline="0" dirty="0" smtClean="0"/>
-              <a:t>module for sector level mapping.</a:t>
-            </a:r>
-          </a:p>
-          <a:p>
-            <a:r>
-              <a:rPr lang="en-US" baseline="0" dirty="0" smtClean="0"/>
-              <a:t>Then </a:t>
-            </a:r>
-            <a:r>
-              <a:rPr lang="en-US" baseline="0" dirty="0" smtClean="0"/>
-              <a:t>I will talk about </a:t>
-            </a:r>
-            <a:r>
-              <a:rPr lang="en-US" baseline="0" dirty="0" smtClean="0"/>
-              <a:t>experiments, </a:t>
-            </a:r>
-            <a:r>
-              <a:rPr lang="en-US" baseline="0" dirty="0" smtClean="0"/>
-              <a:t>and conclusion.</a:t>
+              <a:t>Then I will talk about experiments, and conclusion.</a:t>
             </a:r>
             <a:endParaRPr lang="en-US" dirty="0"/>
           </a:p>
@@ -1832,25 +1979,17 @@
             </a:r>
             <a:r>
               <a:rPr lang="en-US" altLang="ko-KR" baseline="0" dirty="0" smtClean="0"/>
-              <a:t> made two main data structure for sector level </a:t>
+              <a:t> </a:t>
             </a:r>
             <a:r>
               <a:rPr lang="en-US" altLang="ko-KR" baseline="0" dirty="0" smtClean="0"/>
-              <a:t>mapping.</a:t>
+              <a:t>made two main data structure for sector level mapping.</a:t>
             </a:r>
           </a:p>
           <a:p>
             <a:r>
               <a:rPr lang="en-US" altLang="ko-KR" baseline="0" dirty="0" smtClean="0"/>
-              <a:t>One </a:t>
-            </a:r>
-            <a:r>
-              <a:rPr lang="en-US" altLang="ko-KR" baseline="0" dirty="0" smtClean="0"/>
-              <a:t>is </a:t>
-            </a:r>
-            <a:r>
-              <a:rPr lang="en-US" altLang="ko-KR" baseline="0" dirty="0" smtClean="0"/>
-              <a:t>sector mapping table, the other is merge buffer.</a:t>
+              <a:t>One is sector mapping table, the other is merge buffer.</a:t>
             </a:r>
           </a:p>
           <a:p>
@@ -1884,44 +2023,25 @@
             </a:r>
             <a:r>
               <a:rPr lang="en-US" altLang="ko-KR" baseline="0" dirty="0" smtClean="0"/>
-              <a:t> </a:t>
-            </a:r>
+              <a:t> buffer is the buffer merging sectors to a page. </a:t>
+            </a:r>
+          </a:p>
+          <a:p>
             <a:r>
               <a:rPr lang="en-US" altLang="ko-KR" baseline="0" dirty="0" smtClean="0"/>
-              <a:t>buffer is the buffer merging sectors to a page. </a:t>
-            </a:r>
-            <a:endParaRPr lang="en-US" altLang="ko-KR" baseline="0" dirty="0" smtClean="0"/>
+              <a:t>It is because the basic writing unit is page, not sector. </a:t>
+            </a:r>
           </a:p>
           <a:p>
             <a:r>
               <a:rPr lang="en-US" altLang="ko-KR" baseline="0" dirty="0" smtClean="0"/>
-              <a:t>It </a:t>
-            </a:r>
+              <a:t>When write commands comes to FTL, sectors are stacked in this buffer. </a:t>
+            </a:r>
+          </a:p>
+          <a:p>
             <a:r>
               <a:rPr lang="en-US" altLang="ko-KR" baseline="0" dirty="0" smtClean="0"/>
-              <a:t>is because the basic writing unit is page, not sector. </a:t>
-            </a:r>
-            <a:endParaRPr lang="en-US" altLang="ko-KR" baseline="0" dirty="0" smtClean="0"/>
-          </a:p>
-          <a:p>
-            <a:r>
-              <a:rPr lang="en-US" altLang="ko-KR" baseline="0" dirty="0" smtClean="0"/>
-              <a:t>When </a:t>
-            </a:r>
-            <a:r>
-              <a:rPr lang="en-US" altLang="ko-KR" baseline="0" dirty="0" smtClean="0"/>
-              <a:t>write commands comes to FTL, sectors are stacked in this buffer. </a:t>
-            </a:r>
-            <a:endParaRPr lang="en-US" altLang="ko-KR" baseline="0" dirty="0" smtClean="0"/>
-          </a:p>
-          <a:p>
-            <a:r>
-              <a:rPr lang="en-US" altLang="ko-KR" baseline="0" dirty="0" smtClean="0"/>
-              <a:t>And </a:t>
-            </a:r>
-            <a:r>
-              <a:rPr lang="en-US" altLang="ko-KR" baseline="0" dirty="0" smtClean="0"/>
-              <a:t>when merge buffer is full, program these data page to NAND.</a:t>
+              <a:t>And when merge buffer is full, program these data page to NAND.</a:t>
             </a:r>
             <a:endParaRPr lang="ko-KR" altLang="en-US" dirty="0"/>
           </a:p>
@@ -2151,18 +2271,7 @@
                 <a:ea typeface="+mn-ea"/>
                 <a:cs typeface="+mn-cs"/>
               </a:rPr>
-              <a:t>(Y</a:t>
-            </a:r>
-            <a:r>
-              <a:rPr lang="en-US" altLang="ko-KR" sz="1200" u="none" kern="1200" baseline="0" dirty="0" smtClean="0">
-                <a:solidFill>
-                  <a:schemeClr val="tx1"/>
-                </a:solidFill>
-                <a:latin typeface="+mn-lt"/>
-                <a:ea typeface="+mn-ea"/>
-                <a:cs typeface="+mn-cs"/>
-              </a:rPr>
-              <a:t>ou may have a question how can it do if merge buffer is full.)</a:t>
+              <a:t>(You may have a question how can it do if merge buffer is full.)</a:t>
             </a:r>
           </a:p>
           <a:p>
@@ -2177,14 +2286,6 @@
               </a:rPr>
               <a:t>If one page in the merge buffer, FTL flushes the page to NAND, and updates PSNs.</a:t>
             </a:r>
-            <a:endParaRPr lang="en-US" altLang="ko-KR" sz="1200" u="none" kern="1200" baseline="0" dirty="0" smtClean="0">
-              <a:solidFill>
-                <a:schemeClr val="tx1"/>
-              </a:solidFill>
-              <a:latin typeface="+mn-lt"/>
-              <a:ea typeface="+mn-ea"/>
-              <a:cs typeface="+mn-cs"/>
-            </a:endParaRPr>
           </a:p>
         </p:txBody>
       </p:sp>
@@ -2294,7 +2395,6 @@
               <a:rPr lang="en-US" baseline="0" dirty="0" smtClean="0"/>
               <a:t> consideration of our project.</a:t>
             </a:r>
-            <a:endParaRPr lang="en-US" baseline="0" dirty="0" smtClean="0"/>
           </a:p>
           <a:p>
             <a:r>
@@ -2305,15 +2405,7 @@
           <a:p>
             <a:r>
               <a:rPr lang="en-US" baseline="0" dirty="0" smtClean="0"/>
-              <a:t>It</a:t>
-            </a:r>
-            <a:r>
-              <a:rPr lang="en-US" baseline="0" dirty="0" smtClean="0"/>
-              <a:t> </a:t>
-            </a:r>
-            <a:r>
-              <a:rPr lang="en-US" baseline="0" dirty="0" smtClean="0"/>
-              <a:t>is so important.</a:t>
+              <a:t>It is so important.</a:t>
             </a:r>
             <a:endParaRPr lang="en-US" altLang="ko-KR" baseline="0" dirty="0" smtClean="0"/>
           </a:p>
@@ -2362,7 +2454,6 @@
               <a:rPr lang="en-US" altLang="ko-KR" baseline="0" dirty="0" smtClean="0"/>
               <a:t>First large way is ~~, Second large way is ~~.</a:t>
             </a:r>
-            <a:endParaRPr lang="en-US" altLang="ko-KR" baseline="0" dirty="0" smtClean="0"/>
           </a:p>
           <a:p>
             <a:pPr marL="0" marR="0" indent="0" algn="l" defTabSz="914400" rtl="0" eaLnBrk="1" fontAlgn="auto" latinLnBrk="1" hangingPunct="1">
@@ -2465,7 +2556,6 @@
               <a:rPr lang="en-US" altLang="ko-KR" dirty="0" smtClean="0"/>
               <a:t>~~</a:t>
             </a:r>
-            <a:endParaRPr lang="en-US" altLang="ko-KR" dirty="0" smtClean="0"/>
           </a:p>
           <a:p>
             <a:pPr marL="0" marR="0" lvl="1" indent="0" algn="l" defTabSz="914400" rtl="0" eaLnBrk="1" fontAlgn="auto" latinLnBrk="1" hangingPunct="1">
@@ -2521,7 +2611,6 @@
               <a:rPr lang="en-US" altLang="ko-KR" dirty="0" smtClean="0"/>
               <a:t>~~.</a:t>
             </a:r>
-            <a:endParaRPr lang="en-US" altLang="ko-KR" dirty="0" smtClean="0"/>
           </a:p>
           <a:p>
             <a:pPr marL="0" marR="0" lvl="1" indent="0" algn="l" defTabSz="914400" rtl="0" eaLnBrk="1" fontAlgn="auto" latinLnBrk="1" hangingPunct="1">
@@ -4722,7 +4811,6 @@
               <a:rPr lang="en-US" altLang="ko-KR" dirty="0" smtClean="0"/>
               <a:t>Target FTL </a:t>
             </a:r>
-            <a:endParaRPr lang="en-US" altLang="ko-KR" dirty="0" smtClean="0"/>
           </a:p>
           <a:p>
             <a:pPr lvl="1"/>
@@ -4841,6 +4929,278 @@
         </p:nvSpPr>
         <p:spPr/>
         <p:txBody>
+          <a:bodyPr/>
+          <a:lstStyle/>
+          <a:p>
+            <a:r>
+              <a:rPr lang="en-US" altLang="ko-KR" dirty="0" smtClean="0"/>
+              <a:t>Experiments results</a:t>
+            </a:r>
+            <a:endParaRPr lang="ko-KR" altLang="en-US" dirty="0"/>
+          </a:p>
+        </p:txBody>
+      </p:sp>
+      <p:sp>
+        <p:nvSpPr>
+          <p:cNvPr id="3" name="슬라이드 번호 개체 틀 2"/>
+          <p:cNvSpPr>
+            <a:spLocks noGrp="1"/>
+          </p:cNvSpPr>
+          <p:nvPr>
+            <p:ph type="sldNum" sz="quarter" idx="10"/>
+          </p:nvPr>
+        </p:nvSpPr>
+        <p:spPr/>
+        <p:txBody>
+          <a:bodyPr/>
+          <a:lstStyle/>
+          <a:p>
+            <a:fld id="{AEF37EF8-7525-4FA1-A045-D1EE31C2B6AD}" type="slidenum">
+              <a:rPr lang="ko-KR" altLang="en-US" smtClean="0"/>
+              <a:t>11</a:t>
+            </a:fld>
+            <a:endParaRPr lang="ko-KR" altLang="en-US"/>
+          </a:p>
+        </p:txBody>
+      </p:sp>
+      <p:pic>
+        <p:nvPicPr>
+          <p:cNvPr id="4" name="Picture 3"/>
+          <p:cNvPicPr>
+            <a:picLocks noChangeAspect="1"/>
+          </p:cNvPicPr>
+          <p:nvPr/>
+        </p:nvPicPr>
+        <p:blipFill rotWithShape="1">
+          <a:blip r:embed="rId3"/>
+          <a:srcRect l="50980"/>
+          <a:stretch/>
+        </p:blipFill>
+        <p:spPr>
+          <a:xfrm>
+            <a:off x="769439" y="1412776"/>
+            <a:ext cx="7835009" cy="4824536"/>
+          </a:xfrm>
+          <a:prstGeom prst="rect">
+            <a:avLst/>
+          </a:prstGeom>
+        </p:spPr>
+      </p:pic>
+      <p:sp>
+        <p:nvSpPr>
+          <p:cNvPr id="5" name="TextBox 4"/>
+          <p:cNvSpPr txBox="1"/>
+          <p:nvPr/>
+        </p:nvSpPr>
+        <p:spPr>
+          <a:xfrm>
+            <a:off x="971600" y="1484784"/>
+            <a:ext cx="792088" cy="369332"/>
+          </a:xfrm>
+          <a:prstGeom prst="rect">
+            <a:avLst/>
+          </a:prstGeom>
+          <a:noFill/>
+        </p:spPr>
+        <p:txBody>
+          <a:bodyPr wrap="square" rtlCol="0">
+            <a:spAutoFit/>
+          </a:bodyPr>
+          <a:lstStyle/>
+          <a:p>
+            <a:r>
+              <a:rPr lang="en-US" dirty="0" smtClean="0"/>
+              <a:t>IOPS</a:t>
+            </a:r>
+            <a:endParaRPr lang="en-US" dirty="0"/>
+          </a:p>
+        </p:txBody>
+      </p:sp>
+    </p:spTree>
+    <p:extLst>
+      <p:ext uri="{BB962C8B-B14F-4D97-AF65-F5344CB8AC3E}">
+        <p14:creationId xmlns:p14="http://schemas.microsoft.com/office/powerpoint/2010/main" val="1920551361"/>
+      </p:ext>
+    </p:extLst>
+  </p:cSld>
+  <p:clrMapOvr>
+    <a:masterClrMapping/>
+  </p:clrMapOvr>
+  <p:timing>
+    <p:tnLst>
+      <p:par>
+        <p:cTn xmlns:p14="http://schemas.microsoft.com/office/powerpoint/2010/main" id="1" dur="indefinite" restart="never" nodeType="tmRoot"/>
+      </p:par>
+    </p:tnLst>
+  </p:timing>
+</p:sld>
+</file>
+
+<file path=ppt/slides/slide12.xml><?xml version="1.0" encoding="utf-8"?>
+<p:sld xmlns:a="http://schemas.openxmlformats.org/drawingml/2006/main" xmlns:r="http://schemas.openxmlformats.org/officeDocument/2006/relationships" xmlns:p="http://schemas.openxmlformats.org/presentationml/2006/main">
+  <p:cSld>
+    <p:spTree>
+      <p:nvGrpSpPr>
+        <p:cNvPr id="1" name=""/>
+        <p:cNvGrpSpPr/>
+        <p:nvPr/>
+      </p:nvGrpSpPr>
+      <p:grpSpPr>
+        <a:xfrm>
+          <a:off x="0" y="0"/>
+          <a:ext cx="0" cy="0"/>
+          <a:chOff x="0" y="0"/>
+          <a:chExt cx="0" cy="0"/>
+        </a:xfrm>
+      </p:grpSpPr>
+      <p:sp>
+        <p:nvSpPr>
+          <p:cNvPr id="2" name="제목 1"/>
+          <p:cNvSpPr>
+            <a:spLocks noGrp="1"/>
+          </p:cNvSpPr>
+          <p:nvPr>
+            <p:ph type="title"/>
+          </p:nvPr>
+        </p:nvSpPr>
+        <p:spPr/>
+        <p:txBody>
+          <a:bodyPr/>
+          <a:lstStyle/>
+          <a:p>
+            <a:r>
+              <a:rPr lang="en-US" altLang="ko-KR" dirty="0" smtClean="0"/>
+              <a:t>Experiments results</a:t>
+            </a:r>
+            <a:endParaRPr lang="ko-KR" altLang="en-US" dirty="0"/>
+          </a:p>
+        </p:txBody>
+      </p:sp>
+      <p:sp>
+        <p:nvSpPr>
+          <p:cNvPr id="3" name="슬라이드 번호 개체 틀 2"/>
+          <p:cNvSpPr>
+            <a:spLocks noGrp="1"/>
+          </p:cNvSpPr>
+          <p:nvPr>
+            <p:ph type="sldNum" sz="quarter" idx="10"/>
+          </p:nvPr>
+        </p:nvSpPr>
+        <p:spPr/>
+        <p:txBody>
+          <a:bodyPr/>
+          <a:lstStyle/>
+          <a:p>
+            <a:fld id="{AEF37EF8-7525-4FA1-A045-D1EE31C2B6AD}" type="slidenum">
+              <a:rPr lang="ko-KR" altLang="en-US" smtClean="0"/>
+              <a:t>12</a:t>
+            </a:fld>
+            <a:endParaRPr lang="ko-KR" altLang="en-US"/>
+          </a:p>
+        </p:txBody>
+      </p:sp>
+      <p:pic>
+        <p:nvPicPr>
+          <p:cNvPr id="4" name="Picture 3"/>
+          <p:cNvPicPr>
+            <a:picLocks noChangeAspect="1"/>
+          </p:cNvPicPr>
+          <p:nvPr/>
+        </p:nvPicPr>
+        <p:blipFill rotWithShape="1">
+          <a:blip r:embed="rId3"/>
+          <a:srcRect l="50723"/>
+          <a:stretch/>
+        </p:blipFill>
+        <p:spPr>
+          <a:xfrm>
+            <a:off x="755576" y="1412776"/>
+            <a:ext cx="7742592" cy="4752528"/>
+          </a:xfrm>
+          <a:prstGeom prst="rect">
+            <a:avLst/>
+          </a:prstGeom>
+        </p:spPr>
+      </p:pic>
+      <p:sp>
+        <p:nvSpPr>
+          <p:cNvPr id="5" name="TextBox 4"/>
+          <p:cNvSpPr txBox="1"/>
+          <p:nvPr/>
+        </p:nvSpPr>
+        <p:spPr>
+          <a:xfrm>
+            <a:off x="971600" y="1484784"/>
+            <a:ext cx="936104" cy="369332"/>
+          </a:xfrm>
+          <a:prstGeom prst="rect">
+            <a:avLst/>
+          </a:prstGeom>
+          <a:noFill/>
+        </p:spPr>
+        <p:txBody>
+          <a:bodyPr wrap="square" rtlCol="0">
+            <a:spAutoFit/>
+          </a:bodyPr>
+          <a:lstStyle/>
+          <a:p>
+            <a:r>
+              <a:rPr lang="en-US" dirty="0" smtClean="0"/>
+              <a:t>MB/s</a:t>
+            </a:r>
+            <a:endParaRPr lang="en-US" dirty="0"/>
+          </a:p>
+        </p:txBody>
+      </p:sp>
+    </p:spTree>
+    <p:extLst>
+      <p:ext uri="{BB962C8B-B14F-4D97-AF65-F5344CB8AC3E}">
+        <p14:creationId xmlns:p14="http://schemas.microsoft.com/office/powerpoint/2010/main" val="3081402839"/>
+      </p:ext>
+    </p:extLst>
+  </p:cSld>
+  <p:clrMapOvr>
+    <a:masterClrMapping/>
+  </p:clrMapOvr>
+  <p:timing>
+    <p:tnLst>
+      <p:par>
+        <p:cTn xmlns:p14="http://schemas.microsoft.com/office/powerpoint/2010/main" id="1" dur="indefinite" restart="never" nodeType="tmRoot"/>
+      </p:par>
+    </p:tnLst>
+  </p:timing>
+</p:sld>
+</file>
+
+<file path=ppt/slides/slide13.xml><?xml version="1.0" encoding="utf-8"?>
+<p:sld xmlns:a="http://schemas.openxmlformats.org/drawingml/2006/main" xmlns:r="http://schemas.openxmlformats.org/officeDocument/2006/relationships" xmlns:p="http://schemas.openxmlformats.org/presentationml/2006/main">
+  <p:cSld>
+    <p:spTree>
+      <p:nvGrpSpPr>
+        <p:cNvPr id="1" name=""/>
+        <p:cNvGrpSpPr/>
+        <p:nvPr/>
+      </p:nvGrpSpPr>
+      <p:grpSpPr>
+        <a:xfrm>
+          <a:off x="0" y="0"/>
+          <a:ext cx="0" cy="0"/>
+          <a:chOff x="0" y="0"/>
+          <a:chExt cx="0" cy="0"/>
+        </a:xfrm>
+      </p:grpSpPr>
+      <p:sp>
+        <p:nvSpPr>
+          <p:cNvPr id="2" name="제목 1"/>
+          <p:cNvSpPr>
+            <a:spLocks noGrp="1"/>
+          </p:cNvSpPr>
+          <p:nvPr>
+            <p:ph type="title"/>
+          </p:nvPr>
+        </p:nvSpPr>
+        <p:spPr/>
+        <p:txBody>
           <a:bodyPr>
             <a:normAutofit/>
           </a:bodyPr>
@@ -4848,11 +5208,7 @@
           <a:p>
             <a:r>
               <a:rPr lang="en-US" altLang="ko-KR" dirty="0" smtClean="0"/>
-              <a:t>Experiments </a:t>
-            </a:r>
-            <a:r>
-              <a:rPr lang="en-US" altLang="ko-KR" dirty="0" smtClean="0"/>
-              <a:t>results</a:t>
+              <a:t>Experiments results</a:t>
             </a:r>
             <a:endParaRPr lang="ko-KR" altLang="en-US" dirty="0"/>
           </a:p>
@@ -4875,7 +5231,11 @@
           <a:p>
             <a:r>
               <a:rPr lang="en-US" altLang="ko-KR" dirty="0" smtClean="0"/>
-              <a:t>Random Write test </a:t>
+              <a:t>Random Write </a:t>
+            </a:r>
+            <a:r>
+              <a:rPr lang="en-US" altLang="ko-KR" dirty="0" smtClean="0"/>
+              <a:t>Test </a:t>
             </a:r>
             <a:r>
               <a:rPr lang="en-US" altLang="ko-KR" sz="1600" dirty="0" smtClean="0"/>
@@ -4894,7 +5254,11 @@
           <a:p>
             <a:r>
               <a:rPr lang="en-US" altLang="ko-KR" dirty="0" smtClean="0"/>
-              <a:t>Sequential Read/Write test </a:t>
+              <a:t>Sequential Read/Write </a:t>
+            </a:r>
+            <a:r>
+              <a:rPr lang="en-US" altLang="ko-KR" dirty="0" smtClean="0"/>
+              <a:t>Test </a:t>
             </a:r>
             <a:r>
               <a:rPr lang="en-US" altLang="ko-KR" sz="1600" dirty="0" smtClean="0"/>
@@ -4921,7 +5285,7 @@
           <a:p>
             <a:fld id="{AEF37EF8-7525-4FA1-A045-D1EE31C2B6AD}" type="slidenum">
               <a:rPr lang="ko-KR" altLang="en-US" smtClean="0"/>
-              <a:t>11</a:t>
+              <a:t>13</a:t>
             </a:fld>
             <a:endParaRPr lang="ko-KR" altLang="en-US"/>
           </a:p>
@@ -5334,286 +5698,6 @@
 </p:sld>
 </file>
 
-<file path=ppt/slides/slide12.xml><?xml version="1.0" encoding="utf-8"?>
-<p:sld xmlns:a="http://schemas.openxmlformats.org/drawingml/2006/main" xmlns:r="http://schemas.openxmlformats.org/officeDocument/2006/relationships" xmlns:p="http://schemas.openxmlformats.org/presentationml/2006/main">
-  <p:cSld>
-    <p:spTree>
-      <p:nvGrpSpPr>
-        <p:cNvPr id="1" name=""/>
-        <p:cNvGrpSpPr/>
-        <p:nvPr/>
-      </p:nvGrpSpPr>
-      <p:grpSpPr>
-        <a:xfrm>
-          <a:off x="0" y="0"/>
-          <a:ext cx="0" cy="0"/>
-          <a:chOff x="0" y="0"/>
-          <a:chExt cx="0" cy="0"/>
-        </a:xfrm>
-      </p:grpSpPr>
-      <p:sp>
-        <p:nvSpPr>
-          <p:cNvPr id="2" name="제목 1"/>
-          <p:cNvSpPr>
-            <a:spLocks noGrp="1"/>
-          </p:cNvSpPr>
-          <p:nvPr>
-            <p:ph type="title"/>
-          </p:nvPr>
-        </p:nvSpPr>
-        <p:spPr/>
-        <p:txBody>
-          <a:bodyPr/>
-          <a:lstStyle/>
-          <a:p>
-            <a:r>
-              <a:rPr lang="en-US" altLang="ko-KR" dirty="0" smtClean="0"/>
-              <a:t>Experiments </a:t>
-            </a:r>
-            <a:r>
-              <a:rPr lang="en-US" altLang="ko-KR" dirty="0" smtClean="0"/>
-              <a:t>results</a:t>
-            </a:r>
-            <a:endParaRPr lang="ko-KR" altLang="en-US" dirty="0"/>
-          </a:p>
-        </p:txBody>
-      </p:sp>
-      <p:sp>
-        <p:nvSpPr>
-          <p:cNvPr id="3" name="슬라이드 번호 개체 틀 2"/>
-          <p:cNvSpPr>
-            <a:spLocks noGrp="1"/>
-          </p:cNvSpPr>
-          <p:nvPr>
-            <p:ph type="sldNum" sz="quarter" idx="10"/>
-          </p:nvPr>
-        </p:nvSpPr>
-        <p:spPr/>
-        <p:txBody>
-          <a:bodyPr/>
-          <a:lstStyle/>
-          <a:p>
-            <a:fld id="{AEF37EF8-7525-4FA1-A045-D1EE31C2B6AD}" type="slidenum">
-              <a:rPr lang="ko-KR" altLang="en-US" smtClean="0"/>
-              <a:t>12</a:t>
-            </a:fld>
-            <a:endParaRPr lang="ko-KR" altLang="en-US"/>
-          </a:p>
-        </p:txBody>
-      </p:sp>
-      <p:pic>
-        <p:nvPicPr>
-          <p:cNvPr id="4" name="Picture 3"/>
-          <p:cNvPicPr>
-            <a:picLocks noChangeAspect="1"/>
-          </p:cNvPicPr>
-          <p:nvPr/>
-        </p:nvPicPr>
-        <p:blipFill rotWithShape="1">
-          <a:blip r:embed="rId3"/>
-          <a:srcRect l="50980"/>
-          <a:stretch/>
-        </p:blipFill>
-        <p:spPr>
-          <a:xfrm>
-            <a:off x="769439" y="1412776"/>
-            <a:ext cx="7835009" cy="4824536"/>
-          </a:xfrm>
-          <a:prstGeom prst="rect">
-            <a:avLst/>
-          </a:prstGeom>
-        </p:spPr>
-      </p:pic>
-      <p:sp>
-        <p:nvSpPr>
-          <p:cNvPr id="5" name="TextBox 4"/>
-          <p:cNvSpPr txBox="1"/>
-          <p:nvPr/>
-        </p:nvSpPr>
-        <p:spPr>
-          <a:xfrm>
-            <a:off x="971600" y="1484784"/>
-            <a:ext cx="792088" cy="369332"/>
-          </a:xfrm>
-          <a:prstGeom prst="rect">
-            <a:avLst/>
-          </a:prstGeom>
-          <a:noFill/>
-        </p:spPr>
-        <p:txBody>
-          <a:bodyPr wrap="square" rtlCol="0">
-            <a:spAutoFit/>
-          </a:bodyPr>
-          <a:lstStyle/>
-          <a:p>
-            <a:r>
-              <a:rPr lang="en-US" dirty="0" smtClean="0"/>
-              <a:t>IOPS</a:t>
-            </a:r>
-            <a:endParaRPr lang="en-US" dirty="0"/>
-          </a:p>
-        </p:txBody>
-      </p:sp>
-    </p:spTree>
-    <p:extLst>
-      <p:ext uri="{BB962C8B-B14F-4D97-AF65-F5344CB8AC3E}">
-        <p14:creationId xmlns:p14="http://schemas.microsoft.com/office/powerpoint/2010/main" val="1920551361"/>
-      </p:ext>
-    </p:extLst>
-  </p:cSld>
-  <p:clrMapOvr>
-    <a:masterClrMapping/>
-  </p:clrMapOvr>
-  <p:timing>
-    <p:tnLst>
-      <p:par>
-        <p:cTn xmlns:p14="http://schemas.microsoft.com/office/powerpoint/2010/main" id="1" dur="indefinite" restart="never" nodeType="tmRoot"/>
-      </p:par>
-    </p:tnLst>
-  </p:timing>
-</p:sld>
-</file>
-
-<file path=ppt/slides/slide13.xml><?xml version="1.0" encoding="utf-8"?>
-<p:sld xmlns:a="http://schemas.openxmlformats.org/drawingml/2006/main" xmlns:r="http://schemas.openxmlformats.org/officeDocument/2006/relationships" xmlns:p="http://schemas.openxmlformats.org/presentationml/2006/main">
-  <p:cSld>
-    <p:spTree>
-      <p:nvGrpSpPr>
-        <p:cNvPr id="1" name=""/>
-        <p:cNvGrpSpPr/>
-        <p:nvPr/>
-      </p:nvGrpSpPr>
-      <p:grpSpPr>
-        <a:xfrm>
-          <a:off x="0" y="0"/>
-          <a:ext cx="0" cy="0"/>
-          <a:chOff x="0" y="0"/>
-          <a:chExt cx="0" cy="0"/>
-        </a:xfrm>
-      </p:grpSpPr>
-      <p:sp>
-        <p:nvSpPr>
-          <p:cNvPr id="2" name="제목 1"/>
-          <p:cNvSpPr>
-            <a:spLocks noGrp="1"/>
-          </p:cNvSpPr>
-          <p:nvPr>
-            <p:ph type="title"/>
-          </p:nvPr>
-        </p:nvSpPr>
-        <p:spPr/>
-        <p:txBody>
-          <a:bodyPr/>
-          <a:lstStyle/>
-          <a:p>
-            <a:r>
-              <a:rPr lang="en-US" altLang="ko-KR" dirty="0" smtClean="0"/>
-              <a:t>Experiments </a:t>
-            </a:r>
-            <a:r>
-              <a:rPr lang="en-US" altLang="ko-KR" dirty="0" smtClean="0"/>
-              <a:t>results</a:t>
-            </a:r>
-            <a:endParaRPr lang="ko-KR" altLang="en-US" dirty="0"/>
-          </a:p>
-        </p:txBody>
-      </p:sp>
-      <p:sp>
-        <p:nvSpPr>
-          <p:cNvPr id="3" name="슬라이드 번호 개체 틀 2"/>
-          <p:cNvSpPr>
-            <a:spLocks noGrp="1"/>
-          </p:cNvSpPr>
-          <p:nvPr>
-            <p:ph type="sldNum" sz="quarter" idx="10"/>
-          </p:nvPr>
-        </p:nvSpPr>
-        <p:spPr/>
-        <p:txBody>
-          <a:bodyPr/>
-          <a:lstStyle/>
-          <a:p>
-            <a:fld id="{AEF37EF8-7525-4FA1-A045-D1EE31C2B6AD}" type="slidenum">
-              <a:rPr lang="ko-KR" altLang="en-US" smtClean="0"/>
-              <a:t>13</a:t>
-            </a:fld>
-            <a:endParaRPr lang="ko-KR" altLang="en-US"/>
-          </a:p>
-        </p:txBody>
-      </p:sp>
-      <p:pic>
-        <p:nvPicPr>
-          <p:cNvPr id="4" name="Picture 3"/>
-          <p:cNvPicPr>
-            <a:picLocks noChangeAspect="1"/>
-          </p:cNvPicPr>
-          <p:nvPr/>
-        </p:nvPicPr>
-        <p:blipFill rotWithShape="1">
-          <a:blip r:embed="rId3"/>
-          <a:srcRect l="50723"/>
-          <a:stretch/>
-        </p:blipFill>
-        <p:spPr>
-          <a:xfrm>
-            <a:off x="755576" y="1412776"/>
-            <a:ext cx="7742592" cy="4752528"/>
-          </a:xfrm>
-          <a:prstGeom prst="rect">
-            <a:avLst/>
-          </a:prstGeom>
-        </p:spPr>
-      </p:pic>
-      <p:sp>
-        <p:nvSpPr>
-          <p:cNvPr id="5" name="TextBox 4"/>
-          <p:cNvSpPr txBox="1"/>
-          <p:nvPr/>
-        </p:nvSpPr>
-        <p:spPr>
-          <a:xfrm>
-            <a:off x="971600" y="1484784"/>
-            <a:ext cx="936104" cy="369332"/>
-          </a:xfrm>
-          <a:prstGeom prst="rect">
-            <a:avLst/>
-          </a:prstGeom>
-          <a:noFill/>
-        </p:spPr>
-        <p:txBody>
-          <a:bodyPr wrap="square" rtlCol="0">
-            <a:spAutoFit/>
-          </a:bodyPr>
-          <a:lstStyle/>
-          <a:p>
-            <a:r>
-              <a:rPr lang="en-US" dirty="0" smtClean="0"/>
-              <a:t>MB/s</a:t>
-            </a:r>
-            <a:endParaRPr lang="en-US" dirty="0"/>
-          </a:p>
-        </p:txBody>
-      </p:sp>
-    </p:spTree>
-    <p:extLst>
-      <p:ext uri="{BB962C8B-B14F-4D97-AF65-F5344CB8AC3E}">
-        <p14:creationId xmlns:p14="http://schemas.microsoft.com/office/powerpoint/2010/main" val="3081402839"/>
-      </p:ext>
-    </p:extLst>
-  </p:cSld>
-  <p:clrMapOvr>
-    <a:masterClrMapping/>
-  </p:clrMapOvr>
-  <p:timing>
-    <p:tnLst>
-      <p:par>
-        <p:cTn xmlns:p14="http://schemas.microsoft.com/office/powerpoint/2010/main" id="1" dur="indefinite" restart="never" nodeType="tmRoot"/>
-      </p:par>
-    </p:tnLst>
-  </p:timing>
-</p:sld>
-</file>
-
 <file path=ppt/slides/slide14.xml><?xml version="1.0" encoding="utf-8"?>
 <p:sld xmlns:a="http://schemas.openxmlformats.org/drawingml/2006/main" xmlns:r="http://schemas.openxmlformats.org/officeDocument/2006/relationships" xmlns:p="http://schemas.openxmlformats.org/presentationml/2006/main">
   <p:cSld>
@@ -5650,7 +5734,7 @@
           <a:p>
             <a:r>
               <a:rPr lang="en-US" altLang="ko-KR" dirty="0" smtClean="0"/>
-              <a:t>Conclusion</a:t>
+              <a:t>Experiments results</a:t>
             </a:r>
             <a:endParaRPr lang="ko-KR" altLang="en-US" dirty="0"/>
           </a:p>
@@ -5658,7 +5742,7 @@
       </p:sp>
       <p:sp>
         <p:nvSpPr>
-          <p:cNvPr id="3" name="내용 개체 틀 2"/>
+          <p:cNvPr id="4" name="내용 개체 틀 3"/>
           <p:cNvSpPr>
             <a:spLocks noGrp="1"/>
           </p:cNvSpPr>
@@ -5666,62 +5750,53 @@
             <p:ph idx="1"/>
           </p:nvPr>
         </p:nvSpPr>
-        <p:spPr>
-          <a:xfrm>
-            <a:off x="683568" y="1628800"/>
-            <a:ext cx="8064896" cy="4608512"/>
-          </a:xfrm>
-        </p:spPr>
-        <p:txBody>
-          <a:bodyPr>
-            <a:normAutofit/>
-          </a:bodyPr>
+        <p:spPr/>
+        <p:txBody>
+          <a:bodyPr/>
           <a:lstStyle/>
           <a:p>
             <a:r>
               <a:rPr lang="en-US" altLang="ko-KR" dirty="0" smtClean="0"/>
-              <a:t>Small </a:t>
-            </a:r>
-            <a:r>
-              <a:rPr lang="en-US" altLang="ko-KR" dirty="0"/>
-              <a:t>random </a:t>
-            </a:r>
-            <a:r>
-              <a:rPr lang="en-US" altLang="ko-KR" dirty="0" smtClean="0"/>
-              <a:t>write performance </a:t>
-            </a:r>
-            <a:r>
-              <a:rPr lang="en-US" altLang="ko-KR" dirty="0"/>
-              <a:t>of </a:t>
-            </a:r>
-            <a:r>
-              <a:rPr lang="en-US" altLang="ko-KR" dirty="0" smtClean="0"/>
-              <a:t>sector mapping is GREAT!</a:t>
-            </a:r>
-          </a:p>
-          <a:p>
-            <a:r>
-              <a:rPr lang="en-US" altLang="ko-KR" dirty="0" smtClean="0"/>
-              <a:t>Sequential read/write performance of sector mapping is LOW</a:t>
-            </a:r>
-            <a:r>
-              <a:rPr lang="en-US" altLang="ko-KR" dirty="0" smtClean="0"/>
-              <a:t>…</a:t>
-            </a:r>
+              <a:t>Test Without Map Table Caching </a:t>
+            </a:r>
+            <a:r>
+              <a:rPr lang="en-US" altLang="ko-KR" sz="1600" dirty="0" smtClean="0"/>
+              <a:t>( </a:t>
+            </a:r>
+            <a:r>
+              <a:rPr lang="en-US" altLang="ko-KR" sz="1600" dirty="0" smtClean="0"/>
+              <a:t>Average of four tests )</a:t>
+            </a:r>
+          </a:p>
+          <a:p>
             <a:endParaRPr lang="en-US" altLang="ko-KR" dirty="0"/>
           </a:p>
           <a:p>
-            <a:r>
-              <a:rPr lang="en-US" altLang="ko-KR" dirty="0" smtClean="0"/>
-              <a:t>Shrinking mapping table OVERHEAD is important.</a:t>
-            </a:r>
+            <a:endParaRPr lang="en-US" altLang="ko-KR" dirty="0" smtClean="0"/>
+          </a:p>
+          <a:p>
             <a:endParaRPr lang="en-US" altLang="ko-KR" dirty="0"/>
           </a:p>
-        </p:txBody>
-      </p:sp>
-      <p:sp>
-        <p:nvSpPr>
-          <p:cNvPr id="4" name="슬라이드 번호 개체 틀 3"/>
+          <a:p>
+            <a:r>
+              <a:rPr lang="en-US" altLang="ko-KR" dirty="0" smtClean="0"/>
+              <a:t>Test with Map Table Caching </a:t>
+            </a:r>
+            <a:r>
+              <a:rPr lang="en-US" altLang="ko-KR" sz="1600" dirty="0" smtClean="0"/>
+              <a:t>( </a:t>
+            </a:r>
+            <a:r>
+              <a:rPr lang="en-US" altLang="ko-KR" sz="1600" dirty="0" smtClean="0"/>
+              <a:t>Average of four tests )</a:t>
+            </a:r>
+            <a:endParaRPr lang="ko-KR" altLang="en-US" dirty="0"/>
+          </a:p>
+        </p:txBody>
+      </p:sp>
+      <p:sp>
+        <p:nvSpPr>
+          <p:cNvPr id="3" name="슬라이드 번호 개체 틀 2"/>
           <p:cNvSpPr>
             <a:spLocks noGrp="1"/>
           </p:cNvSpPr>
@@ -5742,10 +5817,234 @@
           </a:p>
         </p:txBody>
       </p:sp>
+      <p:pic>
+        <p:nvPicPr>
+          <p:cNvPr id="6" name="Picture 5" descr="스크린샷 2012-02-02 오후 8.43.58.png"/>
+          <p:cNvPicPr>
+            <a:picLocks noChangeAspect="1"/>
+          </p:cNvPicPr>
+          <p:nvPr/>
+        </p:nvPicPr>
+        <p:blipFill>
+          <a:blip r:embed="rId3">
+            <a:extLst>
+              <a:ext uri="{28A0092B-C50C-407E-A947-70E740481C1C}">
+                <a14:useLocalDpi xmlns:a14="http://schemas.microsoft.com/office/drawing/2010/main" val="0"/>
+              </a:ext>
+            </a:extLst>
+          </a:blip>
+          <a:stretch>
+            <a:fillRect/>
+          </a:stretch>
+        </p:blipFill>
+        <p:spPr>
+          <a:xfrm>
+            <a:off x="1043608" y="2276872"/>
+            <a:ext cx="7505700" cy="1638300"/>
+          </a:xfrm>
+          <a:prstGeom prst="rect">
+            <a:avLst/>
+          </a:prstGeom>
+        </p:spPr>
+      </p:pic>
+      <p:sp>
+        <p:nvSpPr>
+          <p:cNvPr id="10" name="Rectangle 9"/>
+          <p:cNvSpPr/>
+          <p:nvPr/>
+        </p:nvSpPr>
+        <p:spPr>
+          <a:xfrm>
+            <a:off x="2123728" y="2276872"/>
+            <a:ext cx="4248472" cy="1584176"/>
+          </a:xfrm>
+          <a:prstGeom prst="rect">
+            <a:avLst/>
+          </a:prstGeom>
+          <a:noFill/>
+          <a:ln w="76200" cmpd="sng">
+            <a:solidFill>
+              <a:srgbClr val="0000FF"/>
+            </a:solidFill>
+          </a:ln>
+        </p:spPr>
+        <p:style>
+          <a:lnRef idx="1">
+            <a:schemeClr val="accent1"/>
+          </a:lnRef>
+          <a:fillRef idx="3">
+            <a:schemeClr val="accent1"/>
+          </a:fillRef>
+          <a:effectRef idx="2">
+            <a:schemeClr val="accent1"/>
+          </a:effectRef>
+          <a:fontRef idx="minor">
+            <a:schemeClr val="lt1"/>
+          </a:fontRef>
+        </p:style>
+        <p:txBody>
+          <a:bodyPr rtlCol="0" anchor="ctr"/>
+          <a:lstStyle/>
+          <a:p>
+            <a:pPr algn="ctr"/>
+            <a:endParaRPr lang="en-US"/>
+          </a:p>
+        </p:txBody>
+      </p:sp>
+      <p:pic>
+        <p:nvPicPr>
+          <p:cNvPr id="12" name="Picture 11" descr="스크린샷 2012-02-03 오전 9.29.56.png"/>
+          <p:cNvPicPr>
+            <a:picLocks noChangeAspect="1"/>
+          </p:cNvPicPr>
+          <p:nvPr/>
+        </p:nvPicPr>
+        <p:blipFill>
+          <a:blip r:embed="rId4">
+            <a:extLst>
+              <a:ext uri="{28A0092B-C50C-407E-A947-70E740481C1C}">
+                <a14:useLocalDpi xmlns:a14="http://schemas.microsoft.com/office/drawing/2010/main" val="0"/>
+              </a:ext>
+            </a:extLst>
+          </a:blip>
+          <a:stretch>
+            <a:fillRect/>
+          </a:stretch>
+        </p:blipFill>
+        <p:spPr>
+          <a:xfrm>
+            <a:off x="1043607" y="4509120"/>
+            <a:ext cx="5400601" cy="686022"/>
+          </a:xfrm>
+          <a:prstGeom prst="rect">
+            <a:avLst/>
+          </a:prstGeom>
+        </p:spPr>
+      </p:pic>
+      <p:sp>
+        <p:nvSpPr>
+          <p:cNvPr id="13" name="Rectangle 12"/>
+          <p:cNvSpPr/>
+          <p:nvPr/>
+        </p:nvSpPr>
+        <p:spPr>
+          <a:xfrm>
+            <a:off x="2339752" y="4509120"/>
+            <a:ext cx="4104456" cy="720080"/>
+          </a:xfrm>
+          <a:prstGeom prst="rect">
+            <a:avLst/>
+          </a:prstGeom>
+          <a:noFill/>
+          <a:ln w="76200" cmpd="sng">
+            <a:solidFill>
+              <a:srgbClr val="0000FF"/>
+            </a:solidFill>
+          </a:ln>
+        </p:spPr>
+        <p:style>
+          <a:lnRef idx="1">
+            <a:schemeClr val="accent1"/>
+          </a:lnRef>
+          <a:fillRef idx="3">
+            <a:schemeClr val="accent1"/>
+          </a:fillRef>
+          <a:effectRef idx="2">
+            <a:schemeClr val="accent1"/>
+          </a:effectRef>
+          <a:fontRef idx="minor">
+            <a:schemeClr val="lt1"/>
+          </a:fontRef>
+        </p:style>
+        <p:txBody>
+          <a:bodyPr rtlCol="0" anchor="ctr"/>
+          <a:lstStyle/>
+          <a:p>
+            <a:pPr algn="ctr"/>
+            <a:endParaRPr lang="en-US"/>
+          </a:p>
+        </p:txBody>
+      </p:sp>
+      <p:cxnSp>
+        <p:nvCxnSpPr>
+          <p:cNvPr id="14" name="Curved Connector 13"/>
+          <p:cNvCxnSpPr>
+            <a:stCxn id="10" idx="3"/>
+            <a:endCxn id="13" idx="3"/>
+          </p:cNvCxnSpPr>
+          <p:nvPr/>
+        </p:nvCxnSpPr>
+        <p:spPr>
+          <a:xfrm>
+            <a:off x="6372200" y="3068960"/>
+            <a:ext cx="72008" cy="1800200"/>
+          </a:xfrm>
+          <a:prstGeom prst="curvedConnector3">
+            <a:avLst>
+              <a:gd name="adj1" fmla="val 1108706"/>
+            </a:avLst>
+          </a:prstGeom>
+          <a:ln w="76200" cmpd="sng">
+            <a:solidFill>
+              <a:schemeClr val="accent6"/>
+            </a:solidFill>
+            <a:headEnd type="none"/>
+            <a:tailEnd type="triangle"/>
+          </a:ln>
+        </p:spPr>
+        <p:style>
+          <a:lnRef idx="2">
+            <a:schemeClr val="accent1"/>
+          </a:lnRef>
+          <a:fillRef idx="0">
+            <a:schemeClr val="accent1"/>
+          </a:fillRef>
+          <a:effectRef idx="1">
+            <a:schemeClr val="accent1"/>
+          </a:effectRef>
+          <a:fontRef idx="minor">
+            <a:schemeClr val="tx1"/>
+          </a:fontRef>
+        </p:style>
+      </p:cxnSp>
+      <p:sp>
+        <p:nvSpPr>
+          <p:cNvPr id="16" name="TextBox 15"/>
+          <p:cNvSpPr txBox="1"/>
+          <p:nvPr/>
+        </p:nvSpPr>
+        <p:spPr>
+          <a:xfrm>
+            <a:off x="7128792" y="4077072"/>
+            <a:ext cx="1907704" cy="461665"/>
+          </a:xfrm>
+          <a:prstGeom prst="rect">
+            <a:avLst/>
+          </a:prstGeom>
+          <a:noFill/>
+        </p:spPr>
+        <p:txBody>
+          <a:bodyPr wrap="square" rtlCol="0">
+            <a:spAutoFit/>
+          </a:bodyPr>
+          <a:lstStyle/>
+          <a:p>
+            <a:r>
+              <a:rPr lang="en-US" sz="2400" dirty="0" smtClean="0"/>
+              <a:t>x</a:t>
+            </a:r>
+            <a:r>
+              <a:rPr lang="en-US" sz="2400" dirty="0" smtClean="0"/>
+              <a:t> 1/50 ~ 1/20</a:t>
+            </a:r>
+            <a:endParaRPr lang="en-US" sz="2400" dirty="0"/>
+          </a:p>
+        </p:txBody>
+      </p:sp>
     </p:spTree>
     <p:extLst>
       <p:ext uri="{BB962C8B-B14F-4D97-AF65-F5344CB8AC3E}">
-        <p14:creationId xmlns:p14="http://schemas.microsoft.com/office/powerpoint/2010/main" val="2857184488"/>
+        <p14:creationId xmlns:p14="http://schemas.microsoft.com/office/powerpoint/2010/main" val="3066225814"/>
       </p:ext>
     </p:extLst>
   </p:cSld>
@@ -5791,12 +6090,14 @@
         </p:nvSpPr>
         <p:spPr/>
         <p:txBody>
-          <a:bodyPr/>
+          <a:bodyPr>
+            <a:normAutofit/>
+          </a:bodyPr>
           <a:lstStyle/>
           <a:p>
             <a:r>
               <a:rPr lang="en-US" altLang="ko-KR" dirty="0" smtClean="0"/>
-              <a:t>References</a:t>
+              <a:t>Conclusion</a:t>
             </a:r>
             <a:endParaRPr lang="ko-KR" altLang="en-US" dirty="0"/>
           </a:p>
@@ -5812,138 +6113,52 @@
             <p:ph idx="1"/>
           </p:nvPr>
         </p:nvSpPr>
-        <p:spPr/>
-        <p:txBody>
-          <a:bodyPr/>
+        <p:spPr>
+          <a:xfrm>
+            <a:off x="683568" y="1628800"/>
+            <a:ext cx="8064896" cy="4608512"/>
+          </a:xfrm>
+        </p:spPr>
+        <p:txBody>
+          <a:bodyPr>
+            <a:normAutofit/>
+          </a:bodyPr>
           <a:lstStyle/>
           <a:p>
-            <a:pPr lvl="0"/>
+            <a:r>
+              <a:rPr lang="en-US" altLang="ko-KR" dirty="0" smtClean="0"/>
+              <a:t>Small </a:t>
+            </a:r>
             <a:r>
               <a:rPr lang="en-US" altLang="ko-KR" dirty="0"/>
-              <a:t>DFTL: a flash translation layer employing demand-based selective caching of page-</a:t>
-            </a:r>
-            <a:r>
-              <a:rPr lang="en-US" altLang="ko-KR" dirty="0" smtClean="0"/>
-              <a:t>level </a:t>
+              <a:t>random </a:t>
+            </a:r>
+            <a:r>
+              <a:rPr lang="en-US" altLang="ko-KR" dirty="0" smtClean="0"/>
+              <a:t>write performance </a:t>
             </a:r>
             <a:r>
               <a:rPr lang="en-US" altLang="ko-KR" dirty="0"/>
-              <a:t>address mappings / </a:t>
-            </a:r>
-            <a:r>
-              <a:rPr lang="ko-KR" altLang="ko-KR" dirty="0"/>
-              <a:t>저자</a:t>
-            </a:r>
-            <a:r>
-              <a:rPr lang="en-US" altLang="ko-KR" dirty="0"/>
-              <a:t>: </a:t>
-            </a:r>
-            <a:r>
-              <a:rPr lang="en-US" altLang="ko-KR" dirty="0" err="1"/>
-              <a:t>Aayush</a:t>
-            </a:r>
-            <a:r>
-              <a:rPr lang="en-US" altLang="ko-KR" dirty="0"/>
-              <a:t> </a:t>
-            </a:r>
-            <a:r>
-              <a:rPr lang="en-US" altLang="ko-KR" dirty="0" err="1"/>
-              <a:t>GuptaKim</a:t>
-            </a:r>
-            <a:r>
-              <a:rPr lang="en-US" altLang="ko-KR" dirty="0"/>
-              <a:t>, </a:t>
-            </a:r>
-            <a:r>
-              <a:rPr lang="en-US" altLang="ko-KR" dirty="0" err="1"/>
-              <a:t>Bhuvan</a:t>
-            </a:r>
-            <a:r>
-              <a:rPr lang="en-US" altLang="ko-KR" dirty="0"/>
-              <a:t> </a:t>
-            </a:r>
-            <a:r>
-              <a:rPr lang="en-US" altLang="ko-KR" dirty="0" err="1"/>
-              <a:t>UrgaonkarYoungjae</a:t>
-            </a:r>
-            <a:r>
-              <a:rPr lang="en-US" altLang="ko-KR" dirty="0"/>
-              <a:t> </a:t>
-            </a:r>
-          </a:p>
-          <a:p>
-            <a:pPr lvl="0"/>
-            <a:r>
-              <a:rPr lang="en-US" altLang="ko-KR" dirty="0" err="1"/>
-              <a:t>OpenSSD</a:t>
-            </a:r>
-            <a:r>
-              <a:rPr lang="en-US" altLang="ko-KR" dirty="0"/>
-              <a:t> Project -  </a:t>
-            </a:r>
-            <a:r>
-              <a:rPr lang="en-US" altLang="ko-KR" dirty="0" err="1"/>
-              <a:t>www.openssd-project.org</a:t>
-            </a:r>
-            <a:r>
-              <a:rPr lang="en-US" altLang="ko-KR" dirty="0"/>
-              <a:t>.</a:t>
-            </a:r>
-            <a:endParaRPr lang="ko-KR" altLang="ko-KR" dirty="0"/>
-          </a:p>
-          <a:p>
-            <a:pPr lvl="0"/>
-            <a:r>
-              <a:rPr lang="en-US" altLang="ko-KR" dirty="0"/>
-              <a:t>The Jasmine </a:t>
-            </a:r>
-            <a:r>
-              <a:rPr lang="en-US" altLang="ko-KR" dirty="0" err="1"/>
-              <a:t>OpenSSD</a:t>
-            </a:r>
-            <a:r>
-              <a:rPr lang="en-US" altLang="ko-KR" dirty="0"/>
-              <a:t> Platform: FTL Developer's Guide –http://</a:t>
-            </a:r>
-            <a:r>
-              <a:rPr lang="en-US" altLang="ko-KR" dirty="0" err="1"/>
-              <a:t>www.openssd-project.org</a:t>
-            </a:r>
-            <a:r>
-              <a:rPr lang="en-US" altLang="ko-KR" dirty="0"/>
-              <a:t>/</a:t>
-            </a:r>
-          </a:p>
-          <a:p>
-            <a:pPr lvl="0"/>
-            <a:r>
-              <a:rPr lang="en-US" altLang="ko-KR" dirty="0"/>
-              <a:t>The Jasmine </a:t>
-            </a:r>
-            <a:r>
-              <a:rPr lang="en-US" altLang="ko-KR" dirty="0" err="1"/>
-              <a:t>OpenSSD</a:t>
-            </a:r>
-            <a:r>
-              <a:rPr lang="en-US" altLang="ko-KR" dirty="0"/>
-              <a:t> Platform: Technical Reference Manual</a:t>
-            </a:r>
-            <a:br>
-              <a:rPr lang="en-US" altLang="ko-KR" dirty="0"/>
-            </a:br>
-            <a:r>
-              <a:rPr lang="en-US" altLang="ko-KR" dirty="0"/>
-              <a:t>- http://</a:t>
-            </a:r>
-            <a:r>
-              <a:rPr lang="en-US" altLang="ko-KR" dirty="0" err="1"/>
-              <a:t>www.openssd-project.org</a:t>
-            </a:r>
-            <a:r>
-              <a:rPr lang="en-US" altLang="ko-KR" dirty="0" smtClean="0"/>
-              <a:t>/</a:t>
-            </a:r>
-            <a:endParaRPr lang="ko-KR" altLang="ko-KR" dirty="0"/>
+              <a:t>of </a:t>
+            </a:r>
+            <a:r>
+              <a:rPr lang="en-US" altLang="ko-KR" dirty="0" smtClean="0"/>
+              <a:t>sector mapping is GREAT!</a:t>
+            </a:r>
+          </a:p>
+          <a:p>
+            <a:r>
+              <a:rPr lang="en-US" altLang="ko-KR" dirty="0" smtClean="0"/>
+              <a:t>Sequential read/write performance of sector mapping is LOW…</a:t>
+            </a:r>
+            <a:endParaRPr lang="en-US" altLang="ko-KR" dirty="0"/>
+          </a:p>
+          <a:p>
+            <a:r>
+              <a:rPr lang="en-US" altLang="ko-KR" dirty="0" smtClean="0"/>
+              <a:t>Shrinking mapping table OVERHEAD is important.</a:t>
+            </a:r>
+            <a:endParaRPr lang="en-US" altLang="ko-KR" dirty="0"/>
           </a:p>
         </p:txBody>
       </p:sp>
@@ -5973,7 +6188,7 @@
     </p:spTree>
     <p:extLst>
       <p:ext uri="{BB962C8B-B14F-4D97-AF65-F5344CB8AC3E}">
-        <p14:creationId xmlns:p14="http://schemas.microsoft.com/office/powerpoint/2010/main" val="2845430015"/>
+        <p14:creationId xmlns:p14="http://schemas.microsoft.com/office/powerpoint/2010/main" val="2857184488"/>
       </p:ext>
     </p:extLst>
   </p:cSld>
@@ -6009,6 +6224,234 @@
       </p:grpSpPr>
       <p:sp>
         <p:nvSpPr>
+          <p:cNvPr id="2" name="제목 1"/>
+          <p:cNvSpPr>
+            <a:spLocks noGrp="1"/>
+          </p:cNvSpPr>
+          <p:nvPr>
+            <p:ph type="title"/>
+          </p:nvPr>
+        </p:nvSpPr>
+        <p:spPr/>
+        <p:txBody>
+          <a:bodyPr/>
+          <a:lstStyle/>
+          <a:p>
+            <a:r>
+              <a:rPr lang="en-US" altLang="ko-KR" dirty="0" smtClean="0"/>
+              <a:t>References</a:t>
+            </a:r>
+            <a:endParaRPr lang="ko-KR" altLang="en-US" dirty="0"/>
+          </a:p>
+        </p:txBody>
+      </p:sp>
+      <p:sp>
+        <p:nvSpPr>
+          <p:cNvPr id="3" name="내용 개체 틀 2"/>
+          <p:cNvSpPr>
+            <a:spLocks noGrp="1"/>
+          </p:cNvSpPr>
+          <p:nvPr>
+            <p:ph idx="1"/>
+          </p:nvPr>
+        </p:nvSpPr>
+        <p:spPr/>
+        <p:txBody>
+          <a:bodyPr/>
+          <a:lstStyle/>
+          <a:p>
+            <a:pPr lvl="0"/>
+            <a:r>
+              <a:rPr lang="en-US" altLang="ko-KR" dirty="0"/>
+              <a:t>DFTL: a flash translation layer employing demand-based selective caching of page-</a:t>
+            </a:r>
+            <a:r>
+              <a:rPr lang="en-US" altLang="ko-KR" dirty="0" smtClean="0"/>
+              <a:t>level </a:t>
+            </a:r>
+            <a:r>
+              <a:rPr lang="en-US" altLang="ko-KR" dirty="0"/>
+              <a:t>address mappings / </a:t>
+            </a:r>
+            <a:r>
+              <a:rPr lang="ko-KR" altLang="ko-KR" dirty="0"/>
+              <a:t>저자</a:t>
+            </a:r>
+            <a:r>
+              <a:rPr lang="en-US" altLang="ko-KR" dirty="0"/>
+              <a:t>: </a:t>
+            </a:r>
+            <a:r>
+              <a:rPr lang="en-US" altLang="ko-KR" dirty="0" err="1"/>
+              <a:t>Aayush</a:t>
+            </a:r>
+            <a:r>
+              <a:rPr lang="en-US" altLang="ko-KR" dirty="0"/>
+              <a:t> </a:t>
+            </a:r>
+            <a:r>
+              <a:rPr lang="en-US" altLang="ko-KR" dirty="0" err="1"/>
+              <a:t>GuptaKim</a:t>
+            </a:r>
+            <a:r>
+              <a:rPr lang="en-US" altLang="ko-KR" dirty="0"/>
+              <a:t>, </a:t>
+            </a:r>
+            <a:r>
+              <a:rPr lang="en-US" altLang="ko-KR" dirty="0" err="1"/>
+              <a:t>Bhuvan</a:t>
+            </a:r>
+            <a:r>
+              <a:rPr lang="en-US" altLang="ko-KR" dirty="0"/>
+              <a:t> </a:t>
+            </a:r>
+            <a:r>
+              <a:rPr lang="en-US" altLang="ko-KR" dirty="0" err="1"/>
+              <a:t>UrgaonkarYoungjae</a:t>
+            </a:r>
+            <a:r>
+              <a:rPr lang="en-US" altLang="ko-KR" dirty="0"/>
+              <a:t> </a:t>
+            </a:r>
+          </a:p>
+          <a:p>
+            <a:pPr lvl="0"/>
+            <a:r>
+              <a:rPr lang="en-US" altLang="ko-KR" dirty="0" err="1"/>
+              <a:t>OpenSSD</a:t>
+            </a:r>
+            <a:r>
+              <a:rPr lang="en-US" altLang="ko-KR" dirty="0"/>
+              <a:t> Project -  </a:t>
+            </a:r>
+            <a:r>
+              <a:rPr lang="en-US" altLang="ko-KR" dirty="0" err="1"/>
+              <a:t>www.openssd-project.org</a:t>
+            </a:r>
+            <a:r>
+              <a:rPr lang="en-US" altLang="ko-KR" dirty="0"/>
+              <a:t>.</a:t>
+            </a:r>
+            <a:endParaRPr lang="ko-KR" altLang="ko-KR" dirty="0"/>
+          </a:p>
+          <a:p>
+            <a:pPr lvl="0"/>
+            <a:r>
+              <a:rPr lang="en-US" altLang="ko-KR" dirty="0"/>
+              <a:t>The Jasmine </a:t>
+            </a:r>
+            <a:r>
+              <a:rPr lang="en-US" altLang="ko-KR" dirty="0" err="1"/>
+              <a:t>OpenSSD</a:t>
+            </a:r>
+            <a:r>
+              <a:rPr lang="en-US" altLang="ko-KR" dirty="0"/>
+              <a:t> Platform: FTL Developer's Guide –http://</a:t>
+            </a:r>
+            <a:r>
+              <a:rPr lang="en-US" altLang="ko-KR" dirty="0" err="1"/>
+              <a:t>www.openssd-project.org</a:t>
+            </a:r>
+            <a:r>
+              <a:rPr lang="en-US" altLang="ko-KR" dirty="0"/>
+              <a:t>/</a:t>
+            </a:r>
+          </a:p>
+          <a:p>
+            <a:pPr lvl="0"/>
+            <a:r>
+              <a:rPr lang="en-US" altLang="ko-KR" dirty="0"/>
+              <a:t>The Jasmine </a:t>
+            </a:r>
+            <a:r>
+              <a:rPr lang="en-US" altLang="ko-KR" dirty="0" err="1"/>
+              <a:t>OpenSSD</a:t>
+            </a:r>
+            <a:r>
+              <a:rPr lang="en-US" altLang="ko-KR" dirty="0"/>
+              <a:t> Platform: Technical Reference Manual</a:t>
+            </a:r>
+            <a:br>
+              <a:rPr lang="en-US" altLang="ko-KR" dirty="0"/>
+            </a:br>
+            <a:r>
+              <a:rPr lang="en-US" altLang="ko-KR" dirty="0"/>
+              <a:t>- http://</a:t>
+            </a:r>
+            <a:r>
+              <a:rPr lang="en-US" altLang="ko-KR" dirty="0" err="1"/>
+              <a:t>www.openssd-project.org</a:t>
+            </a:r>
+            <a:r>
+              <a:rPr lang="en-US" altLang="ko-KR" dirty="0" smtClean="0"/>
+              <a:t>/</a:t>
+            </a:r>
+            <a:endParaRPr lang="ko-KR" altLang="ko-KR" dirty="0"/>
+          </a:p>
+        </p:txBody>
+      </p:sp>
+      <p:sp>
+        <p:nvSpPr>
+          <p:cNvPr id="4" name="슬라이드 번호 개체 틀 3"/>
+          <p:cNvSpPr>
+            <a:spLocks noGrp="1"/>
+          </p:cNvSpPr>
+          <p:nvPr>
+            <p:ph type="sldNum" sz="quarter" idx="10"/>
+          </p:nvPr>
+        </p:nvSpPr>
+        <p:spPr/>
+        <p:txBody>
+          <a:bodyPr/>
+          <a:lstStyle/>
+          <a:p>
+            <a:fld id="{AEF37EF8-7525-4FA1-A045-D1EE31C2B6AD}" type="slidenum">
+              <a:rPr lang="ko-KR" altLang="en-US" smtClean="0"/>
+              <a:t>16</a:t>
+            </a:fld>
+            <a:endParaRPr lang="ko-KR" altLang="en-US"/>
+          </a:p>
+        </p:txBody>
+      </p:sp>
+    </p:spTree>
+    <p:extLst>
+      <p:ext uri="{BB962C8B-B14F-4D97-AF65-F5344CB8AC3E}">
+        <p14:creationId xmlns:p14="http://schemas.microsoft.com/office/powerpoint/2010/main" val="2845430015"/>
+      </p:ext>
+    </p:extLst>
+  </p:cSld>
+  <p:clrMapOvr>
+    <a:masterClrMapping/>
+  </p:clrMapOvr>
+  <p:timing>
+    <p:tnLst>
+      <p:par>
+        <p:cTn xmlns:p14="http://schemas.microsoft.com/office/powerpoint/2010/main" id="1" dur="indefinite" restart="never" nodeType="tmRoot"/>
+      </p:par>
+    </p:tnLst>
+  </p:timing>
+</p:sld>
+</file>
+
+<file path=ppt/slides/slide17.xml><?xml version="1.0" encoding="utf-8"?>
+<p:sld xmlns:a="http://schemas.openxmlformats.org/drawingml/2006/main" xmlns:r="http://schemas.openxmlformats.org/officeDocument/2006/relationships" xmlns:p="http://schemas.openxmlformats.org/presentationml/2006/main">
+  <p:cSld>
+    <p:spTree>
+      <p:nvGrpSpPr>
+        <p:cNvPr id="1" name=""/>
+        <p:cNvGrpSpPr/>
+        <p:nvPr/>
+      </p:nvGrpSpPr>
+      <p:grpSpPr>
+        <a:xfrm>
+          <a:off x="0" y="0"/>
+          <a:ext cx="0" cy="0"/>
+          <a:chOff x="0" y="0"/>
+          <a:chExt cx="0" cy="0"/>
+        </a:xfrm>
+      </p:grpSpPr>
+      <p:sp>
+        <p:nvSpPr>
           <p:cNvPr id="5" name="제목 4"/>
           <p:cNvSpPr>
             <a:spLocks noGrp="1"/>
@@ -6047,7 +6490,7 @@
           <a:p>
             <a:fld id="{AEF37EF8-7525-4FA1-A045-D1EE31C2B6AD}" type="slidenum">
               <a:rPr lang="ko-KR" altLang="en-US" smtClean="0"/>
-              <a:t>16</a:t>
+              <a:t>17</a:t>
             </a:fld>
             <a:endParaRPr lang="ko-KR" altLang="en-US"/>
           </a:p>
@@ -6224,7 +6667,6 @@
               <a:rPr lang="en-US" altLang="ko-KR" dirty="0" smtClean="0"/>
               <a:t>Experiments</a:t>
             </a:r>
-            <a:endParaRPr lang="en-US" altLang="ko-KR" dirty="0" smtClean="0"/>
           </a:p>
           <a:p>
             <a:r>
@@ -7352,7 +7794,7 @@
             <p:ph idx="1"/>
             <p:extLst>
               <p:ext uri="{D42A27DB-BD31-4B8C-83A1-F6EECF244321}">
-                <p14:modId xmlns:p14="http://schemas.microsoft.com/office/powerpoint/2010/main" val="2410992489"/>
+                <p14:modId xmlns:p14="http://schemas.microsoft.com/office/powerpoint/2010/main" val="547484131"/>
               </p:ext>
             </p:extLst>
           </p:nvPr>
@@ -7420,7 +7862,7 @@
                       <a:pPr algn="ctr" latinLnBrk="1"/>
                       <a:r>
                         <a:rPr lang="en-US" altLang="ko-KR" sz="1800" dirty="0" smtClean="0"/>
-                        <a:t>100</a:t>
+                        <a:t>20</a:t>
                       </a:r>
                       <a:endParaRPr lang="ko-KR" altLang="en-US" sz="1800" dirty="0"/>
                     </a:p>
@@ -7452,7 +7894,7 @@
                       <a:pPr algn="ctr" latinLnBrk="1"/>
                       <a:r>
                         <a:rPr lang="en-US" altLang="ko-KR" sz="1800" dirty="0" smtClean="0"/>
-                        <a:t>101</a:t>
+                        <a:t>21</a:t>
                       </a:r>
                       <a:endParaRPr lang="ko-KR" altLang="en-US" sz="1800" dirty="0"/>
                     </a:p>
@@ -7468,6 +7910,42 @@
                       <a:r>
                         <a:rPr lang="en-US" altLang="ko-KR" sz="1800" dirty="0" smtClean="0"/>
                         <a:t>0x80...</a:t>
+                      </a:r>
+                      <a:endParaRPr lang="ko-KR" altLang="en-US" sz="1800" dirty="0"/>
+                    </a:p>
+                  </a:txBody>
+                  <a:tcPr/>
+                </a:tc>
+              </a:tr>
+              <a:tr h="168713">
+                <a:tc>
+                  <a:txBody>
+                    <a:bodyPr/>
+                    <a:lstStyle/>
+                    <a:p>
+                      <a:pPr algn="ctr" latinLnBrk="1"/>
+                      <a:r>
+                        <a:rPr lang="en-US" altLang="ko-KR" sz="1800" dirty="0" smtClean="0"/>
+                        <a:t>22</a:t>
+                      </a:r>
+                      <a:endParaRPr lang="ko-KR" altLang="en-US" sz="1800" dirty="0"/>
+                    </a:p>
+                  </a:txBody>
+                  <a:tcPr/>
+                </a:tc>
+                <a:tc>
+                  <a:txBody>
+                    <a:bodyPr/>
+                    <a:lstStyle/>
+                    <a:p>
+                      <a:pPr algn="ctr" latinLnBrk="1"/>
+                      <a:r>
+                        <a:rPr lang="en-US" altLang="ko-KR" sz="1800" dirty="0" smtClean="0"/>
+                        <a:t>0x80</a:t>
+                      </a:r>
+                      <a:r>
+                        <a:rPr lang="en-US" altLang="ko-KR" sz="1800" dirty="0" smtClean="0"/>
+                        <a:t>…</a:t>
                       </a:r>
                       <a:endParaRPr lang="ko-KR" altLang="en-US" sz="1800" dirty="0"/>
                     </a:p>
@@ -7527,7 +8005,7 @@
                       <a:pPr algn="ctr" latinLnBrk="1"/>
                       <a:r>
                         <a:rPr lang="en-US" altLang="ko-KR" sz="1800" dirty="0" smtClean="0"/>
-                        <a:t>20</a:t>
+                        <a:t>100</a:t>
                       </a:r>
                       <a:endParaRPr lang="ko-KR" altLang="en-US" sz="1800" dirty="0"/>
                     </a:p>
@@ -7559,39 +8037,7 @@
                       <a:pPr algn="ctr" latinLnBrk="1"/>
                       <a:r>
                         <a:rPr lang="en-US" altLang="ko-KR" sz="1800" dirty="0" smtClean="0"/>
-                        <a:t>21</a:t>
-                      </a:r>
-                      <a:endParaRPr lang="ko-KR" altLang="en-US" sz="1800" dirty="0"/>
-                    </a:p>
-                  </a:txBody>
-                  <a:tcPr/>
-                </a:tc>
-                <a:tc>
-                  <a:txBody>
-                    <a:bodyPr/>
-                    <a:lstStyle/>
-                    <a:p>
-                      <a:pPr algn="ctr" latinLnBrk="1"/>
-                      <a:r>
-                        <a:rPr lang="en-US" altLang="ko-KR" sz="1800" dirty="0" smtClean="0"/>
-                        <a:t>0x80...</a:t>
-                      </a:r>
-                      <a:endParaRPr lang="ko-KR" altLang="en-US" sz="1800" dirty="0"/>
-                    </a:p>
-                  </a:txBody>
-                  <a:tcPr/>
-                </a:tc>
-              </a:tr>
-              <a:tr h="168713">
-                <a:tc>
-                  <a:txBody>
-                    <a:bodyPr/>
-                    <a:lstStyle/>
-                    <a:p>
-                      <a:pPr algn="ctr" latinLnBrk="1"/>
-                      <a:r>
-                        <a:rPr lang="en-US" altLang="ko-KR" sz="1800" dirty="0" smtClean="0"/>
-                        <a:t>22</a:t>
+                        <a:t>101</a:t>
                       </a:r>
                       <a:endParaRPr lang="ko-KR" altLang="en-US" sz="1800" dirty="0"/>
                     </a:p>
@@ -8411,11 +8857,7 @@
           <a:p>
             <a:r>
               <a:rPr lang="en-US" altLang="ko-KR" dirty="0" smtClean="0"/>
-              <a:t>Considerations : </a:t>
-            </a:r>
-            <a:r>
-              <a:rPr lang="en-US" altLang="ko-KR" dirty="0" smtClean="0"/>
-              <a:t>How to Fill Merge Buffer?</a:t>
+              <a:t>Considerations : How to Fill Merge Buffer?</a:t>
             </a:r>
             <a:endParaRPr lang="ko-KR" altLang="en-US" dirty="0"/>
           </a:p>
@@ -8453,13 +8895,8 @@
             <a:pPr lvl="1" algn="just"/>
             <a:r>
               <a:rPr lang="en-US" altLang="ko-KR" dirty="0" smtClean="0"/>
-              <a:t>Multi-copy : Just put sectors, but put </a:t>
-            </a:r>
-            <a:r>
-              <a:rPr lang="en-US" altLang="ko-KR" dirty="0" smtClean="0"/>
-              <a:t>sectors with succeeding LBAs at once</a:t>
-            </a:r>
-            <a:endParaRPr lang="en-US" altLang="ko-KR" dirty="0" smtClean="0"/>
+              <a:t>Multi-copy : Just put sectors, but put sectors with succeeding LBAs at once</a:t>
+            </a:r>
           </a:p>
           <a:p>
             <a:pPr algn="just"/>
@@ -8479,15 +8916,7 @@
             <a:pPr lvl="1" algn="just"/>
             <a:r>
               <a:rPr lang="en-US" altLang="ko-KR" dirty="0" smtClean="0"/>
-              <a:t>Static : Distribute sectors to merge buffers, bu</a:t>
-            </a:r>
-            <a:r>
-              <a:rPr lang="en-US" altLang="ko-KR" dirty="0" smtClean="0"/>
-              <a:t>t bank number</a:t>
-            </a:r>
-            <a:r>
-              <a:rPr lang="en-US" altLang="ko-KR" dirty="0" smtClean="0"/>
-              <a:t> is fixed by LBA</a:t>
+              <a:t>Static : Distribute sectors to merge buffers, but bank number is fixed by LBA</a:t>
             </a:r>
             <a:endParaRPr lang="ko-KR" altLang="en-US" dirty="0"/>
           </a:p>
@@ -8582,282 +9011,6 @@
           </a:p>
         </p:txBody>
       </p:sp>
-      <p:graphicFrame>
-        <p:nvGraphicFramePr>
-          <p:cNvPr id="4" name="내용 개체 틀 3"/>
-          <p:cNvGraphicFramePr>
-            <a:graphicFrameLocks noGrp="1"/>
-          </p:cNvGraphicFramePr>
-          <p:nvPr>
-            <p:ph idx="1"/>
-            <p:extLst>
-              <p:ext uri="{D42A27DB-BD31-4B8C-83A1-F6EECF244321}">
-                <p14:modId xmlns:p14="http://schemas.microsoft.com/office/powerpoint/2010/main" val="3163971551"/>
-              </p:ext>
-            </p:extLst>
-          </p:nvPr>
-        </p:nvGraphicFramePr>
-        <p:xfrm>
-          <a:off x="7092282" y="1444925"/>
-          <a:ext cx="1799558" cy="2560320"/>
-        </p:xfrm>
-        <a:graphic>
-          <a:graphicData uri="http://schemas.openxmlformats.org/drawingml/2006/table">
-            <a:tbl>
-              <a:tblPr firstRow="1" bandRow="1">
-                <a:tableStyleId>{5940675A-B579-460E-94D1-54222C63F5DA}</a:tableStyleId>
-              </a:tblPr>
-              <a:tblGrid>
-                <a:gridCol w="899779"/>
-                <a:gridCol w="899779"/>
-              </a:tblGrid>
-              <a:tr h="273152">
-                <a:tc>
-                  <a:txBody>
-                    <a:bodyPr/>
-                    <a:lstStyle/>
-                    <a:p>
-                      <a:pPr algn="ctr" latinLnBrk="1"/>
-                      <a:r>
-                        <a:rPr lang="en-US" altLang="ko-KR" sz="1800" dirty="0" smtClean="0"/>
-                        <a:t>LSN</a:t>
-                      </a:r>
-                      <a:endParaRPr lang="ko-KR" altLang="en-US" sz="1800" dirty="0"/>
-                    </a:p>
-                  </a:txBody>
-                  <a:tcPr>
-                    <a:solidFill>
-                      <a:schemeClr val="accent2"/>
-                    </a:solidFill>
-                  </a:tcPr>
-                </a:tc>
-                <a:tc>
-                  <a:txBody>
-                    <a:bodyPr/>
-                    <a:lstStyle/>
-                    <a:p>
-                      <a:pPr algn="ctr" latinLnBrk="1"/>
-                      <a:r>
-                        <a:rPr lang="en-US" altLang="ko-KR" sz="1800" dirty="0" smtClean="0"/>
-                        <a:t>PSN</a:t>
-                      </a:r>
-                      <a:endParaRPr lang="ko-KR" altLang="en-US" sz="1800" dirty="0"/>
-                    </a:p>
-                  </a:txBody>
-                  <a:tcPr>
-                    <a:solidFill>
-                      <a:schemeClr val="accent2"/>
-                    </a:solidFill>
-                  </a:tcPr>
-                </a:tc>
-              </a:tr>
-              <a:tr h="273152">
-                <a:tc>
-                  <a:txBody>
-                    <a:bodyPr/>
-                    <a:lstStyle/>
-                    <a:p>
-                      <a:pPr algn="ctr" latinLnBrk="1"/>
-                      <a:r>
-                        <a:rPr lang="en-US" altLang="ko-KR" sz="1800" dirty="0" smtClean="0"/>
-                        <a:t>100</a:t>
-                      </a:r>
-                      <a:endParaRPr lang="ko-KR" altLang="en-US" sz="1800" dirty="0"/>
-                    </a:p>
-                  </a:txBody>
-                  <a:tcPr/>
-                </a:tc>
-                <a:tc>
-                  <a:txBody>
-                    <a:bodyPr/>
-                    <a:lstStyle/>
-                    <a:p>
-                      <a:pPr algn="ctr" latinLnBrk="1"/>
-                      <a:r>
-                        <a:rPr lang="en-US" altLang="ko-KR" sz="1800" dirty="0" smtClean="0"/>
-                        <a:t>0x80...</a:t>
-                      </a:r>
-                      <a:endParaRPr lang="ko-KR" altLang="en-US" sz="1800" dirty="0"/>
-                    </a:p>
-                  </a:txBody>
-                  <a:tcPr/>
-                </a:tc>
-              </a:tr>
-              <a:tr h="273152">
-                <a:tc>
-                  <a:txBody>
-                    <a:bodyPr/>
-                    <a:lstStyle/>
-                    <a:p>
-                      <a:pPr algn="ctr" latinLnBrk="1"/>
-                      <a:r>
-                        <a:rPr lang="en-US" altLang="ko-KR" sz="1800" dirty="0" smtClean="0"/>
-                        <a:t>101</a:t>
-                      </a:r>
-                      <a:endParaRPr lang="ko-KR" altLang="en-US" sz="1800" dirty="0"/>
-                    </a:p>
-                  </a:txBody>
-                  <a:tcPr/>
-                </a:tc>
-                <a:tc>
-                  <a:txBody>
-                    <a:bodyPr/>
-                    <a:lstStyle/>
-                    <a:p>
-                      <a:pPr algn="ctr" latinLnBrk="1"/>
-                      <a:r>
-                        <a:rPr lang="en-US" altLang="ko-KR" sz="1800" dirty="0" smtClean="0"/>
-                        <a:t>0x80...</a:t>
-                      </a:r>
-                      <a:endParaRPr lang="ko-KR" altLang="en-US" sz="1800" dirty="0"/>
-                    </a:p>
-                  </a:txBody>
-                  <a:tcPr/>
-                </a:tc>
-              </a:tr>
-              <a:tr h="273152">
-                <a:tc gridSpan="2">
-                  <a:txBody>
-                    <a:bodyPr/>
-                    <a:lstStyle/>
-                    <a:p>
-                      <a:pPr algn="ctr" latinLnBrk="1"/>
-                      <a:r>
-                        <a:rPr lang="en-US" altLang="ko-KR" sz="1800" dirty="0" smtClean="0"/>
-                        <a:t>.....</a:t>
-                      </a:r>
-                      <a:endParaRPr lang="ko-KR" altLang="en-US" sz="1800" dirty="0"/>
-                    </a:p>
-                  </a:txBody>
-                  <a:tcPr>
-                    <a:lnL w="12700" cap="flat" cmpd="sng" algn="ctr">
-                      <a:noFill/>
-                      <a:prstDash val="solid"/>
-                      <a:round/>
-                      <a:headEnd type="none" w="med" len="med"/>
-                      <a:tailEnd type="none" w="med" len="med"/>
-                    </a:lnL>
-                    <a:lnR w="12700" cap="flat" cmpd="sng" algn="ctr">
-                      <a:noFill/>
-                      <a:prstDash val="solid"/>
-                      <a:round/>
-                      <a:headEnd type="none" w="med" len="med"/>
-                      <a:tailEnd type="none" w="med" len="med"/>
-                    </a:lnR>
-                  </a:tcPr>
-                </a:tc>
-                <a:tc hMerge="1">
-                  <a:txBody>
-                    <a:bodyPr/>
-                    <a:lstStyle/>
-                    <a:p>
-                      <a:pPr algn="ctr" latinLnBrk="1"/>
-                      <a:endParaRPr lang="ko-KR" altLang="en-US" dirty="0"/>
-                    </a:p>
-                  </a:txBody>
-                  <a:tcPr/>
-                </a:tc>
-              </a:tr>
-              <a:tr h="273152">
-                <a:tc>
-                  <a:txBody>
-                    <a:bodyPr/>
-                    <a:lstStyle/>
-                    <a:p>
-                      <a:pPr algn="ctr" latinLnBrk="1"/>
-                      <a:r>
-                        <a:rPr lang="en-US" altLang="ko-KR" sz="1800" dirty="0" smtClean="0"/>
-                        <a:t>20</a:t>
-                      </a:r>
-                      <a:endParaRPr lang="ko-KR" altLang="en-US" sz="1800" dirty="0"/>
-                    </a:p>
-                  </a:txBody>
-                  <a:tcPr/>
-                </a:tc>
-                <a:tc>
-                  <a:txBody>
-                    <a:bodyPr/>
-                    <a:lstStyle/>
-                    <a:p>
-                      <a:pPr algn="ctr" latinLnBrk="1"/>
-                      <a:r>
-                        <a:rPr lang="en-US" altLang="ko-KR" sz="1800" dirty="0" smtClean="0"/>
-                        <a:t>0x80...</a:t>
-                      </a:r>
-                      <a:endParaRPr lang="ko-KR" altLang="en-US" sz="1800" dirty="0"/>
-                    </a:p>
-                  </a:txBody>
-                  <a:tcPr/>
-                </a:tc>
-              </a:tr>
-              <a:tr h="273152">
-                <a:tc>
-                  <a:txBody>
-                    <a:bodyPr/>
-                    <a:lstStyle/>
-                    <a:p>
-                      <a:pPr algn="ctr" latinLnBrk="1"/>
-                      <a:r>
-                        <a:rPr lang="en-US" altLang="ko-KR" sz="1800" dirty="0" smtClean="0"/>
-                        <a:t>21</a:t>
-                      </a:r>
-                      <a:endParaRPr lang="ko-KR" altLang="en-US" sz="1800" dirty="0"/>
-                    </a:p>
-                  </a:txBody>
-                  <a:tcPr/>
-                </a:tc>
-                <a:tc>
-                  <a:txBody>
-                    <a:bodyPr/>
-                    <a:lstStyle/>
-                    <a:p>
-                      <a:pPr algn="ctr" latinLnBrk="1"/>
-                      <a:r>
-                        <a:rPr lang="en-US" altLang="ko-KR" sz="1800" dirty="0" smtClean="0"/>
-                        <a:t>0x80...</a:t>
-                      </a:r>
-                      <a:endParaRPr lang="ko-KR" altLang="en-US" sz="1800" dirty="0"/>
-                    </a:p>
-                  </a:txBody>
-                  <a:tcPr/>
-                </a:tc>
-              </a:tr>
-              <a:tr h="273152">
-                <a:tc>
-                  <a:txBody>
-                    <a:bodyPr/>
-                    <a:lstStyle/>
-                    <a:p>
-                      <a:pPr algn="ctr" latinLnBrk="1"/>
-                      <a:r>
-                        <a:rPr lang="en-US" altLang="ko-KR" sz="1800" dirty="0" smtClean="0"/>
-                        <a:t>22</a:t>
-                      </a:r>
-                      <a:endParaRPr lang="ko-KR" altLang="en-US" sz="1800" dirty="0"/>
-                    </a:p>
-                  </a:txBody>
-                  <a:tcPr/>
-                </a:tc>
-                <a:tc>
-                  <a:txBody>
-                    <a:bodyPr/>
-                    <a:lstStyle/>
-                    <a:p>
-                      <a:pPr algn="ctr" latinLnBrk="1"/>
-                      <a:r>
-                        <a:rPr lang="en-US" altLang="ko-KR" sz="1800" dirty="0" smtClean="0"/>
-                        <a:t>0x80...</a:t>
-                      </a:r>
-                      <a:endParaRPr lang="ko-KR" altLang="en-US" sz="1800" dirty="0"/>
-                    </a:p>
-                  </a:txBody>
-                  <a:tcPr/>
-                </a:tc>
-              </a:tr>
-            </a:tbl>
-          </a:graphicData>
-        </a:graphic>
-      </p:graphicFrame>
       <p:sp>
         <p:nvSpPr>
           <p:cNvPr id="5" name="TextBox 4"/>
@@ -9597,6 +9750,286 @@
           </a:p>
         </p:txBody>
       </p:sp>
+      <p:graphicFrame>
+        <p:nvGraphicFramePr>
+          <p:cNvPr id="21" name="내용 개체 틀 3"/>
+          <p:cNvGraphicFramePr>
+            <a:graphicFrameLocks noGrp="1"/>
+          </p:cNvGraphicFramePr>
+          <p:nvPr>
+            <p:ph idx="1"/>
+            <p:extLst>
+              <p:ext uri="{D42A27DB-BD31-4B8C-83A1-F6EECF244321}">
+                <p14:modId xmlns:p14="http://schemas.microsoft.com/office/powerpoint/2010/main" val="3584043658"/>
+              </p:ext>
+            </p:extLst>
+          </p:nvPr>
+        </p:nvGraphicFramePr>
+        <p:xfrm>
+          <a:off x="7092282" y="1444925"/>
+          <a:ext cx="1799558" cy="2560320"/>
+        </p:xfrm>
+        <a:graphic>
+          <a:graphicData uri="http://schemas.openxmlformats.org/drawingml/2006/table">
+            <a:tbl>
+              <a:tblPr firstRow="1" bandRow="1">
+                <a:tableStyleId>{5940675A-B579-460E-94D1-54222C63F5DA}</a:tableStyleId>
+              </a:tblPr>
+              <a:tblGrid>
+                <a:gridCol w="899779"/>
+                <a:gridCol w="899779"/>
+              </a:tblGrid>
+              <a:tr h="149143">
+                <a:tc>
+                  <a:txBody>
+                    <a:bodyPr/>
+                    <a:lstStyle/>
+                    <a:p>
+                      <a:pPr algn="ctr" latinLnBrk="1"/>
+                      <a:r>
+                        <a:rPr lang="en-US" altLang="ko-KR" sz="1800" dirty="0" smtClean="0"/>
+                        <a:t>LSN</a:t>
+                      </a:r>
+                      <a:endParaRPr lang="ko-KR" altLang="en-US" sz="1800" dirty="0"/>
+                    </a:p>
+                  </a:txBody>
+                  <a:tcPr>
+                    <a:solidFill>
+                      <a:schemeClr val="accent2"/>
+                    </a:solidFill>
+                  </a:tcPr>
+                </a:tc>
+                <a:tc>
+                  <a:txBody>
+                    <a:bodyPr/>
+                    <a:lstStyle/>
+                    <a:p>
+                      <a:pPr algn="ctr" latinLnBrk="1"/>
+                      <a:r>
+                        <a:rPr lang="en-US" altLang="ko-KR" sz="1800" dirty="0" smtClean="0"/>
+                        <a:t>PSN</a:t>
+                      </a:r>
+                      <a:endParaRPr lang="ko-KR" altLang="en-US" sz="1800" dirty="0"/>
+                    </a:p>
+                  </a:txBody>
+                  <a:tcPr>
+                    <a:solidFill>
+                      <a:schemeClr val="accent2"/>
+                    </a:solidFill>
+                  </a:tcPr>
+                </a:tc>
+              </a:tr>
+              <a:tr h="168713">
+                <a:tc>
+                  <a:txBody>
+                    <a:bodyPr/>
+                    <a:lstStyle/>
+                    <a:p>
+                      <a:pPr algn="ctr" latinLnBrk="1"/>
+                      <a:r>
+                        <a:rPr lang="en-US" altLang="ko-KR" sz="1800" dirty="0" smtClean="0"/>
+                        <a:t>20</a:t>
+                      </a:r>
+                      <a:endParaRPr lang="ko-KR" altLang="en-US" sz="1800" dirty="0"/>
+                    </a:p>
+                  </a:txBody>
+                  <a:tcPr/>
+                </a:tc>
+                <a:tc>
+                  <a:txBody>
+                    <a:bodyPr/>
+                    <a:lstStyle/>
+                    <a:p>
+                      <a:pPr algn="ctr" latinLnBrk="1"/>
+                      <a:r>
+                        <a:rPr lang="en-US" altLang="ko-KR" sz="1800" dirty="0" smtClean="0"/>
+                        <a:t>0x80...</a:t>
+                      </a:r>
+                      <a:endParaRPr lang="ko-KR" altLang="en-US" sz="1800" dirty="0"/>
+                    </a:p>
+                  </a:txBody>
+                  <a:tcPr/>
+                </a:tc>
+              </a:tr>
+              <a:tr h="168713">
+                <a:tc>
+                  <a:txBody>
+                    <a:bodyPr/>
+                    <a:lstStyle/>
+                    <a:p>
+                      <a:pPr algn="ctr" latinLnBrk="1"/>
+                      <a:r>
+                        <a:rPr lang="en-US" altLang="ko-KR" sz="1800" dirty="0" smtClean="0"/>
+                        <a:t>21</a:t>
+                      </a:r>
+                      <a:endParaRPr lang="ko-KR" altLang="en-US" sz="1800" dirty="0"/>
+                    </a:p>
+                  </a:txBody>
+                  <a:tcPr/>
+                </a:tc>
+                <a:tc>
+                  <a:txBody>
+                    <a:bodyPr/>
+                    <a:lstStyle/>
+                    <a:p>
+                      <a:pPr algn="ctr" latinLnBrk="1"/>
+                      <a:r>
+                        <a:rPr lang="en-US" altLang="ko-KR" sz="1800" dirty="0" smtClean="0"/>
+                        <a:t>0x80...</a:t>
+                      </a:r>
+                      <a:endParaRPr lang="ko-KR" altLang="en-US" sz="1800" dirty="0"/>
+                    </a:p>
+                  </a:txBody>
+                  <a:tcPr/>
+                </a:tc>
+              </a:tr>
+              <a:tr h="168713">
+                <a:tc>
+                  <a:txBody>
+                    <a:bodyPr/>
+                    <a:lstStyle/>
+                    <a:p>
+                      <a:pPr algn="ctr" latinLnBrk="1"/>
+                      <a:r>
+                        <a:rPr lang="en-US" altLang="ko-KR" sz="1800" dirty="0" smtClean="0"/>
+                        <a:t>22</a:t>
+                      </a:r>
+                      <a:endParaRPr lang="ko-KR" altLang="en-US" sz="1800" dirty="0"/>
+                    </a:p>
+                  </a:txBody>
+                  <a:tcPr/>
+                </a:tc>
+                <a:tc>
+                  <a:txBody>
+                    <a:bodyPr/>
+                    <a:lstStyle/>
+                    <a:p>
+                      <a:pPr algn="ctr" latinLnBrk="1"/>
+                      <a:r>
+                        <a:rPr lang="en-US" altLang="ko-KR" sz="1800" dirty="0" smtClean="0"/>
+                        <a:t>0x80</a:t>
+                      </a:r>
+                      <a:r>
+                        <a:rPr lang="en-US" altLang="ko-KR" sz="1800" dirty="0" smtClean="0"/>
+                        <a:t>…</a:t>
+                      </a:r>
+                      <a:endParaRPr lang="ko-KR" altLang="en-US" sz="1800" dirty="0"/>
+                    </a:p>
+                  </a:txBody>
+                  <a:tcPr/>
+                </a:tc>
+              </a:tr>
+              <a:tr h="149143">
+                <a:tc gridSpan="2">
+                  <a:txBody>
+                    <a:bodyPr/>
+                    <a:lstStyle/>
+                    <a:p>
+                      <a:pPr algn="ctr" latinLnBrk="1"/>
+                      <a:r>
+                        <a:rPr lang="en-US" altLang="ko-KR" sz="1800" dirty="0" smtClean="0"/>
+                        <a:t>.....</a:t>
+                      </a:r>
+                      <a:endParaRPr lang="ko-KR" altLang="en-US" sz="1800" dirty="0"/>
+                    </a:p>
+                  </a:txBody>
+                  <a:tcPr>
+                    <a:lnL w="12700" cap="flat" cmpd="sng" algn="ctr">
+                      <a:noFill/>
+                      <a:prstDash val="solid"/>
+                      <a:round/>
+                      <a:headEnd type="none" w="med" len="med"/>
+                      <a:tailEnd type="none" w="med" len="med"/>
+                    </a:lnL>
+                    <a:lnR w="12700" cap="flat" cmpd="sng" algn="ctr">
+                      <a:noFill/>
+                      <a:prstDash val="solid"/>
+                      <a:round/>
+                      <a:headEnd type="none" w="med" len="med"/>
+                      <a:tailEnd type="none" w="med" len="med"/>
+                    </a:lnR>
+                  </a:tcPr>
+                </a:tc>
+                <a:tc hMerge="1">
+                  <a:txBody>
+                    <a:bodyPr/>
+                    <a:lstStyle/>
+                    <a:p>
+                      <a:pPr algn="ctr" latinLnBrk="1"/>
+                      <a:endParaRPr lang="ko-KR" altLang="en-US" dirty="0"/>
+                    </a:p>
+                  </a:txBody>
+                  <a:tcPr/>
+                </a:tc>
+              </a:tr>
+              <a:tr h="168713">
+                <a:tc>
+                  <a:txBody>
+                    <a:bodyPr/>
+                    <a:lstStyle/>
+                    <a:p>
+                      <a:pPr algn="ctr" latinLnBrk="1"/>
+                      <a:r>
+                        <a:rPr lang="en-US" altLang="ko-KR" sz="1800" dirty="0" smtClean="0"/>
+                        <a:t>100</a:t>
+                      </a:r>
+                      <a:endParaRPr lang="ko-KR" altLang="en-US" sz="1800" dirty="0"/>
+                    </a:p>
+                  </a:txBody>
+                  <a:tcPr/>
+                </a:tc>
+                <a:tc>
+                  <a:txBody>
+                    <a:bodyPr/>
+                    <a:lstStyle/>
+                    <a:p>
+                      <a:pPr algn="ctr" latinLnBrk="1"/>
+                      <a:r>
+                        <a:rPr lang="en-US" altLang="ko-KR" sz="1800" dirty="0" smtClean="0"/>
+                        <a:t>0x80...</a:t>
+                      </a:r>
+                      <a:endParaRPr lang="ko-KR" altLang="en-US" sz="1800" dirty="0"/>
+                    </a:p>
+                  </a:txBody>
+                  <a:tcPr/>
+                </a:tc>
+              </a:tr>
+              <a:tr h="168713">
+                <a:tc>
+                  <a:txBody>
+                    <a:bodyPr/>
+                    <a:lstStyle/>
+                    <a:p>
+                      <a:pPr algn="ctr" latinLnBrk="1"/>
+                      <a:r>
+                        <a:rPr lang="en-US" altLang="ko-KR" sz="1800" dirty="0" smtClean="0"/>
+                        <a:t>101</a:t>
+                      </a:r>
+                      <a:endParaRPr lang="ko-KR" altLang="en-US" sz="1800" dirty="0"/>
+                    </a:p>
+                  </a:txBody>
+                  <a:tcPr/>
+                </a:tc>
+                <a:tc>
+                  <a:txBody>
+                    <a:bodyPr/>
+                    <a:lstStyle/>
+                    <a:p>
+                      <a:pPr algn="ctr" latinLnBrk="1"/>
+                      <a:r>
+                        <a:rPr lang="en-US" altLang="ko-KR" sz="1800" dirty="0" smtClean="0"/>
+                        <a:t>0x80...</a:t>
+                      </a:r>
+                      <a:endParaRPr lang="ko-KR" altLang="en-US" sz="1800" dirty="0"/>
+                    </a:p>
+                  </a:txBody>
+                  <a:tcPr/>
+                </a:tc>
+              </a:tr>
+            </a:tbl>
+          </a:graphicData>
+        </a:graphic>
+      </p:graphicFrame>
     </p:spTree>
     <p:extLst>
       <p:ext uri="{BB962C8B-B14F-4D97-AF65-F5344CB8AC3E}">
@@ -9663,282 +10096,6 @@
           </a:p>
         </p:txBody>
       </p:sp>
-      <p:graphicFrame>
-        <p:nvGraphicFramePr>
-          <p:cNvPr id="4" name="내용 개체 틀 3"/>
-          <p:cNvGraphicFramePr>
-            <a:graphicFrameLocks noGrp="1"/>
-          </p:cNvGraphicFramePr>
-          <p:nvPr>
-            <p:ph idx="1"/>
-            <p:extLst>
-              <p:ext uri="{D42A27DB-BD31-4B8C-83A1-F6EECF244321}">
-                <p14:modId xmlns:p14="http://schemas.microsoft.com/office/powerpoint/2010/main" val="132961944"/>
-              </p:ext>
-            </p:extLst>
-          </p:nvPr>
-        </p:nvGraphicFramePr>
-        <p:xfrm>
-          <a:off x="7092282" y="1444924"/>
-          <a:ext cx="1799558" cy="2560320"/>
-        </p:xfrm>
-        <a:graphic>
-          <a:graphicData uri="http://schemas.openxmlformats.org/drawingml/2006/table">
-            <a:tbl>
-              <a:tblPr firstRow="1" bandRow="1">
-                <a:tableStyleId>{5940675A-B579-460E-94D1-54222C63F5DA}</a:tableStyleId>
-              </a:tblPr>
-              <a:tblGrid>
-                <a:gridCol w="899779"/>
-                <a:gridCol w="899779"/>
-              </a:tblGrid>
-              <a:tr h="0">
-                <a:tc>
-                  <a:txBody>
-                    <a:bodyPr/>
-                    <a:lstStyle/>
-                    <a:p>
-                      <a:pPr algn="ctr" latinLnBrk="1"/>
-                      <a:r>
-                        <a:rPr lang="en-US" altLang="ko-KR" sz="1800" dirty="0" smtClean="0"/>
-                        <a:t>LSN</a:t>
-                      </a:r>
-                      <a:endParaRPr lang="ko-KR" altLang="en-US" sz="1800" dirty="0"/>
-                    </a:p>
-                  </a:txBody>
-                  <a:tcPr>
-                    <a:solidFill>
-                      <a:schemeClr val="accent2"/>
-                    </a:solidFill>
-                  </a:tcPr>
-                </a:tc>
-                <a:tc>
-                  <a:txBody>
-                    <a:bodyPr/>
-                    <a:lstStyle/>
-                    <a:p>
-                      <a:pPr algn="ctr" latinLnBrk="1"/>
-                      <a:r>
-                        <a:rPr lang="en-US" altLang="ko-KR" sz="1800" dirty="0" smtClean="0"/>
-                        <a:t>PSN</a:t>
-                      </a:r>
-                      <a:endParaRPr lang="ko-KR" altLang="en-US" sz="1800" dirty="0"/>
-                    </a:p>
-                  </a:txBody>
-                  <a:tcPr>
-                    <a:solidFill>
-                      <a:schemeClr val="accent2"/>
-                    </a:solidFill>
-                  </a:tcPr>
-                </a:tc>
-              </a:tr>
-              <a:tr h="0">
-                <a:tc>
-                  <a:txBody>
-                    <a:bodyPr/>
-                    <a:lstStyle/>
-                    <a:p>
-                      <a:pPr algn="ctr" latinLnBrk="1"/>
-                      <a:r>
-                        <a:rPr lang="en-US" altLang="ko-KR" sz="1800" dirty="0" smtClean="0"/>
-                        <a:t>100</a:t>
-                      </a:r>
-                      <a:endParaRPr lang="ko-KR" altLang="en-US" sz="1800" dirty="0"/>
-                    </a:p>
-                  </a:txBody>
-                  <a:tcPr/>
-                </a:tc>
-                <a:tc>
-                  <a:txBody>
-                    <a:bodyPr/>
-                    <a:lstStyle/>
-                    <a:p>
-                      <a:pPr algn="ctr" latinLnBrk="1"/>
-                      <a:r>
-                        <a:rPr lang="en-US" altLang="ko-KR" sz="1800" dirty="0" smtClean="0"/>
-                        <a:t>0x80...</a:t>
-                      </a:r>
-                      <a:endParaRPr lang="ko-KR" altLang="en-US" sz="1800" dirty="0"/>
-                    </a:p>
-                  </a:txBody>
-                  <a:tcPr/>
-                </a:tc>
-              </a:tr>
-              <a:tr h="0">
-                <a:tc>
-                  <a:txBody>
-                    <a:bodyPr/>
-                    <a:lstStyle/>
-                    <a:p>
-                      <a:pPr algn="ctr" latinLnBrk="1"/>
-                      <a:r>
-                        <a:rPr lang="en-US" altLang="ko-KR" sz="1800" dirty="0" smtClean="0"/>
-                        <a:t>101</a:t>
-                      </a:r>
-                      <a:endParaRPr lang="ko-KR" altLang="en-US" sz="1800" dirty="0"/>
-                    </a:p>
-                  </a:txBody>
-                  <a:tcPr/>
-                </a:tc>
-                <a:tc>
-                  <a:txBody>
-                    <a:bodyPr/>
-                    <a:lstStyle/>
-                    <a:p>
-                      <a:pPr algn="ctr" latinLnBrk="1"/>
-                      <a:r>
-                        <a:rPr lang="en-US" altLang="ko-KR" sz="1800" dirty="0" smtClean="0"/>
-                        <a:t>0x80...</a:t>
-                      </a:r>
-                      <a:endParaRPr lang="ko-KR" altLang="en-US" sz="1800" dirty="0"/>
-                    </a:p>
-                  </a:txBody>
-                  <a:tcPr/>
-                </a:tc>
-              </a:tr>
-              <a:tr h="0">
-                <a:tc gridSpan="2">
-                  <a:txBody>
-                    <a:bodyPr/>
-                    <a:lstStyle/>
-                    <a:p>
-                      <a:pPr algn="ctr" latinLnBrk="1"/>
-                      <a:r>
-                        <a:rPr lang="en-US" altLang="ko-KR" sz="1800" dirty="0" smtClean="0"/>
-                        <a:t>.....</a:t>
-                      </a:r>
-                      <a:endParaRPr lang="ko-KR" altLang="en-US" sz="1800" dirty="0"/>
-                    </a:p>
-                  </a:txBody>
-                  <a:tcPr>
-                    <a:lnL w="12700" cap="flat" cmpd="sng" algn="ctr">
-                      <a:noFill/>
-                      <a:prstDash val="solid"/>
-                      <a:round/>
-                      <a:headEnd type="none" w="med" len="med"/>
-                      <a:tailEnd type="none" w="med" len="med"/>
-                    </a:lnL>
-                    <a:lnR w="12700" cap="flat" cmpd="sng" algn="ctr">
-                      <a:noFill/>
-                      <a:prstDash val="solid"/>
-                      <a:round/>
-                      <a:headEnd type="none" w="med" len="med"/>
-                      <a:tailEnd type="none" w="med" len="med"/>
-                    </a:lnR>
-                  </a:tcPr>
-                </a:tc>
-                <a:tc hMerge="1">
-                  <a:txBody>
-                    <a:bodyPr/>
-                    <a:lstStyle/>
-                    <a:p>
-                      <a:pPr algn="ctr" latinLnBrk="1"/>
-                      <a:endParaRPr lang="ko-KR" altLang="en-US" dirty="0"/>
-                    </a:p>
-                  </a:txBody>
-                  <a:tcPr/>
-                </a:tc>
-              </a:tr>
-              <a:tr h="0">
-                <a:tc>
-                  <a:txBody>
-                    <a:bodyPr/>
-                    <a:lstStyle/>
-                    <a:p>
-                      <a:pPr algn="ctr" latinLnBrk="1"/>
-                      <a:r>
-                        <a:rPr lang="en-US" altLang="ko-KR" sz="1800" dirty="0" smtClean="0"/>
-                        <a:t>20</a:t>
-                      </a:r>
-                      <a:endParaRPr lang="ko-KR" altLang="en-US" sz="1800" dirty="0"/>
-                    </a:p>
-                  </a:txBody>
-                  <a:tcPr/>
-                </a:tc>
-                <a:tc>
-                  <a:txBody>
-                    <a:bodyPr/>
-                    <a:lstStyle/>
-                    <a:p>
-                      <a:pPr algn="ctr" latinLnBrk="1"/>
-                      <a:r>
-                        <a:rPr lang="en-US" altLang="ko-KR" sz="1800" dirty="0" smtClean="0"/>
-                        <a:t>0x80...</a:t>
-                      </a:r>
-                      <a:endParaRPr lang="ko-KR" altLang="en-US" sz="1800" dirty="0"/>
-                    </a:p>
-                  </a:txBody>
-                  <a:tcPr/>
-                </a:tc>
-              </a:tr>
-              <a:tr h="0">
-                <a:tc>
-                  <a:txBody>
-                    <a:bodyPr/>
-                    <a:lstStyle/>
-                    <a:p>
-                      <a:pPr algn="ctr" latinLnBrk="1"/>
-                      <a:r>
-                        <a:rPr lang="en-US" altLang="ko-KR" sz="1800" dirty="0" smtClean="0"/>
-                        <a:t>21</a:t>
-                      </a:r>
-                      <a:endParaRPr lang="ko-KR" altLang="en-US" sz="1800" dirty="0"/>
-                    </a:p>
-                  </a:txBody>
-                  <a:tcPr/>
-                </a:tc>
-                <a:tc>
-                  <a:txBody>
-                    <a:bodyPr/>
-                    <a:lstStyle/>
-                    <a:p>
-                      <a:pPr algn="ctr" latinLnBrk="1"/>
-                      <a:r>
-                        <a:rPr lang="en-US" altLang="ko-KR" sz="1800" dirty="0" smtClean="0"/>
-                        <a:t>0x80...</a:t>
-                      </a:r>
-                      <a:endParaRPr lang="ko-KR" altLang="en-US" sz="1800" dirty="0"/>
-                    </a:p>
-                  </a:txBody>
-                  <a:tcPr/>
-                </a:tc>
-              </a:tr>
-              <a:tr h="0">
-                <a:tc>
-                  <a:txBody>
-                    <a:bodyPr/>
-                    <a:lstStyle/>
-                    <a:p>
-                      <a:pPr algn="ctr" latinLnBrk="1"/>
-                      <a:r>
-                        <a:rPr lang="en-US" altLang="ko-KR" sz="1800" dirty="0" smtClean="0"/>
-                        <a:t>22</a:t>
-                      </a:r>
-                      <a:endParaRPr lang="ko-KR" altLang="en-US" sz="1800" dirty="0"/>
-                    </a:p>
-                  </a:txBody>
-                  <a:tcPr/>
-                </a:tc>
-                <a:tc>
-                  <a:txBody>
-                    <a:bodyPr/>
-                    <a:lstStyle/>
-                    <a:p>
-                      <a:pPr algn="ctr" latinLnBrk="1"/>
-                      <a:r>
-                        <a:rPr lang="en-US" altLang="ko-KR" sz="1800" dirty="0" smtClean="0"/>
-                        <a:t>0x80...</a:t>
-                      </a:r>
-                      <a:endParaRPr lang="ko-KR" altLang="en-US" sz="1800" dirty="0"/>
-                    </a:p>
-                  </a:txBody>
-                  <a:tcPr/>
-                </a:tc>
-              </a:tr>
-            </a:tbl>
-          </a:graphicData>
-        </a:graphic>
-      </p:graphicFrame>
       <p:sp>
         <p:nvSpPr>
           <p:cNvPr id="5" name="TextBox 4"/>
@@ -10685,6 +10842,286 @@
           </a:p>
         </p:txBody>
       </p:sp>
+      <p:graphicFrame>
+        <p:nvGraphicFramePr>
+          <p:cNvPr id="21" name="내용 개체 틀 3"/>
+          <p:cNvGraphicFramePr>
+            <a:graphicFrameLocks noGrp="1"/>
+          </p:cNvGraphicFramePr>
+          <p:nvPr>
+            <p:ph idx="1"/>
+            <p:extLst>
+              <p:ext uri="{D42A27DB-BD31-4B8C-83A1-F6EECF244321}">
+                <p14:modId xmlns:p14="http://schemas.microsoft.com/office/powerpoint/2010/main" val="3584043658"/>
+              </p:ext>
+            </p:extLst>
+          </p:nvPr>
+        </p:nvGraphicFramePr>
+        <p:xfrm>
+          <a:off x="7092282" y="1444925"/>
+          <a:ext cx="1799558" cy="2560320"/>
+        </p:xfrm>
+        <a:graphic>
+          <a:graphicData uri="http://schemas.openxmlformats.org/drawingml/2006/table">
+            <a:tbl>
+              <a:tblPr firstRow="1" bandRow="1">
+                <a:tableStyleId>{5940675A-B579-460E-94D1-54222C63F5DA}</a:tableStyleId>
+              </a:tblPr>
+              <a:tblGrid>
+                <a:gridCol w="899779"/>
+                <a:gridCol w="899779"/>
+              </a:tblGrid>
+              <a:tr h="149143">
+                <a:tc>
+                  <a:txBody>
+                    <a:bodyPr/>
+                    <a:lstStyle/>
+                    <a:p>
+                      <a:pPr algn="ctr" latinLnBrk="1"/>
+                      <a:r>
+                        <a:rPr lang="en-US" altLang="ko-KR" sz="1800" dirty="0" smtClean="0"/>
+                        <a:t>LSN</a:t>
+                      </a:r>
+                      <a:endParaRPr lang="ko-KR" altLang="en-US" sz="1800" dirty="0"/>
+                    </a:p>
+                  </a:txBody>
+                  <a:tcPr>
+                    <a:solidFill>
+                      <a:schemeClr val="accent2"/>
+                    </a:solidFill>
+                  </a:tcPr>
+                </a:tc>
+                <a:tc>
+                  <a:txBody>
+                    <a:bodyPr/>
+                    <a:lstStyle/>
+                    <a:p>
+                      <a:pPr algn="ctr" latinLnBrk="1"/>
+                      <a:r>
+                        <a:rPr lang="en-US" altLang="ko-KR" sz="1800" dirty="0" smtClean="0"/>
+                        <a:t>PSN</a:t>
+                      </a:r>
+                      <a:endParaRPr lang="ko-KR" altLang="en-US" sz="1800" dirty="0"/>
+                    </a:p>
+                  </a:txBody>
+                  <a:tcPr>
+                    <a:solidFill>
+                      <a:schemeClr val="accent2"/>
+                    </a:solidFill>
+                  </a:tcPr>
+                </a:tc>
+              </a:tr>
+              <a:tr h="168713">
+                <a:tc>
+                  <a:txBody>
+                    <a:bodyPr/>
+                    <a:lstStyle/>
+                    <a:p>
+                      <a:pPr algn="ctr" latinLnBrk="1"/>
+                      <a:r>
+                        <a:rPr lang="en-US" altLang="ko-KR" sz="1800" dirty="0" smtClean="0"/>
+                        <a:t>20</a:t>
+                      </a:r>
+                      <a:endParaRPr lang="ko-KR" altLang="en-US" sz="1800" dirty="0"/>
+                    </a:p>
+                  </a:txBody>
+                  <a:tcPr/>
+                </a:tc>
+                <a:tc>
+                  <a:txBody>
+                    <a:bodyPr/>
+                    <a:lstStyle/>
+                    <a:p>
+                      <a:pPr algn="ctr" latinLnBrk="1"/>
+                      <a:r>
+                        <a:rPr lang="en-US" altLang="ko-KR" sz="1800" dirty="0" smtClean="0"/>
+                        <a:t>0x80...</a:t>
+                      </a:r>
+                      <a:endParaRPr lang="ko-KR" altLang="en-US" sz="1800" dirty="0"/>
+                    </a:p>
+                  </a:txBody>
+                  <a:tcPr/>
+                </a:tc>
+              </a:tr>
+              <a:tr h="168713">
+                <a:tc>
+                  <a:txBody>
+                    <a:bodyPr/>
+                    <a:lstStyle/>
+                    <a:p>
+                      <a:pPr algn="ctr" latinLnBrk="1"/>
+                      <a:r>
+                        <a:rPr lang="en-US" altLang="ko-KR" sz="1800" dirty="0" smtClean="0"/>
+                        <a:t>21</a:t>
+                      </a:r>
+                      <a:endParaRPr lang="ko-KR" altLang="en-US" sz="1800" dirty="0"/>
+                    </a:p>
+                  </a:txBody>
+                  <a:tcPr/>
+                </a:tc>
+                <a:tc>
+                  <a:txBody>
+                    <a:bodyPr/>
+                    <a:lstStyle/>
+                    <a:p>
+                      <a:pPr algn="ctr" latinLnBrk="1"/>
+                      <a:r>
+                        <a:rPr lang="en-US" altLang="ko-KR" sz="1800" dirty="0" smtClean="0"/>
+                        <a:t>0x80...</a:t>
+                      </a:r>
+                      <a:endParaRPr lang="ko-KR" altLang="en-US" sz="1800" dirty="0"/>
+                    </a:p>
+                  </a:txBody>
+                  <a:tcPr/>
+                </a:tc>
+              </a:tr>
+              <a:tr h="168713">
+                <a:tc>
+                  <a:txBody>
+                    <a:bodyPr/>
+                    <a:lstStyle/>
+                    <a:p>
+                      <a:pPr algn="ctr" latinLnBrk="1"/>
+                      <a:r>
+                        <a:rPr lang="en-US" altLang="ko-KR" sz="1800" dirty="0" smtClean="0"/>
+                        <a:t>22</a:t>
+                      </a:r>
+                      <a:endParaRPr lang="ko-KR" altLang="en-US" sz="1800" dirty="0"/>
+                    </a:p>
+                  </a:txBody>
+                  <a:tcPr/>
+                </a:tc>
+                <a:tc>
+                  <a:txBody>
+                    <a:bodyPr/>
+                    <a:lstStyle/>
+                    <a:p>
+                      <a:pPr algn="ctr" latinLnBrk="1"/>
+                      <a:r>
+                        <a:rPr lang="en-US" altLang="ko-KR" sz="1800" dirty="0" smtClean="0"/>
+                        <a:t>0x80</a:t>
+                      </a:r>
+                      <a:r>
+                        <a:rPr lang="en-US" altLang="ko-KR" sz="1800" dirty="0" smtClean="0"/>
+                        <a:t>…</a:t>
+                      </a:r>
+                      <a:endParaRPr lang="ko-KR" altLang="en-US" sz="1800" dirty="0"/>
+                    </a:p>
+                  </a:txBody>
+                  <a:tcPr/>
+                </a:tc>
+              </a:tr>
+              <a:tr h="149143">
+                <a:tc gridSpan="2">
+                  <a:txBody>
+                    <a:bodyPr/>
+                    <a:lstStyle/>
+                    <a:p>
+                      <a:pPr algn="ctr" latinLnBrk="1"/>
+                      <a:r>
+                        <a:rPr lang="en-US" altLang="ko-KR" sz="1800" dirty="0" smtClean="0"/>
+                        <a:t>.....</a:t>
+                      </a:r>
+                      <a:endParaRPr lang="ko-KR" altLang="en-US" sz="1800" dirty="0"/>
+                    </a:p>
+                  </a:txBody>
+                  <a:tcPr>
+                    <a:lnL w="12700" cap="flat" cmpd="sng" algn="ctr">
+                      <a:noFill/>
+                      <a:prstDash val="solid"/>
+                      <a:round/>
+                      <a:headEnd type="none" w="med" len="med"/>
+                      <a:tailEnd type="none" w="med" len="med"/>
+                    </a:lnL>
+                    <a:lnR w="12700" cap="flat" cmpd="sng" algn="ctr">
+                      <a:noFill/>
+                      <a:prstDash val="solid"/>
+                      <a:round/>
+                      <a:headEnd type="none" w="med" len="med"/>
+                      <a:tailEnd type="none" w="med" len="med"/>
+                    </a:lnR>
+                  </a:tcPr>
+                </a:tc>
+                <a:tc hMerge="1">
+                  <a:txBody>
+                    <a:bodyPr/>
+                    <a:lstStyle/>
+                    <a:p>
+                      <a:pPr algn="ctr" latinLnBrk="1"/>
+                      <a:endParaRPr lang="ko-KR" altLang="en-US" dirty="0"/>
+                    </a:p>
+                  </a:txBody>
+                  <a:tcPr/>
+                </a:tc>
+              </a:tr>
+              <a:tr h="168713">
+                <a:tc>
+                  <a:txBody>
+                    <a:bodyPr/>
+                    <a:lstStyle/>
+                    <a:p>
+                      <a:pPr algn="ctr" latinLnBrk="1"/>
+                      <a:r>
+                        <a:rPr lang="en-US" altLang="ko-KR" sz="1800" dirty="0" smtClean="0"/>
+                        <a:t>100</a:t>
+                      </a:r>
+                      <a:endParaRPr lang="ko-KR" altLang="en-US" sz="1800" dirty="0"/>
+                    </a:p>
+                  </a:txBody>
+                  <a:tcPr/>
+                </a:tc>
+                <a:tc>
+                  <a:txBody>
+                    <a:bodyPr/>
+                    <a:lstStyle/>
+                    <a:p>
+                      <a:pPr algn="ctr" latinLnBrk="1"/>
+                      <a:r>
+                        <a:rPr lang="en-US" altLang="ko-KR" sz="1800" dirty="0" smtClean="0"/>
+                        <a:t>0x80...</a:t>
+                      </a:r>
+                      <a:endParaRPr lang="ko-KR" altLang="en-US" sz="1800" dirty="0"/>
+                    </a:p>
+                  </a:txBody>
+                  <a:tcPr/>
+                </a:tc>
+              </a:tr>
+              <a:tr h="168713">
+                <a:tc>
+                  <a:txBody>
+                    <a:bodyPr/>
+                    <a:lstStyle/>
+                    <a:p>
+                      <a:pPr algn="ctr" latinLnBrk="1"/>
+                      <a:r>
+                        <a:rPr lang="en-US" altLang="ko-KR" sz="1800" dirty="0" smtClean="0"/>
+                        <a:t>101</a:t>
+                      </a:r>
+                      <a:endParaRPr lang="ko-KR" altLang="en-US" sz="1800" dirty="0"/>
+                    </a:p>
+                  </a:txBody>
+                  <a:tcPr/>
+                </a:tc>
+                <a:tc>
+                  <a:txBody>
+                    <a:bodyPr/>
+                    <a:lstStyle/>
+                    <a:p>
+                      <a:pPr algn="ctr" latinLnBrk="1"/>
+                      <a:r>
+                        <a:rPr lang="en-US" altLang="ko-KR" sz="1800" dirty="0" smtClean="0"/>
+                        <a:t>0x80...</a:t>
+                      </a:r>
+                      <a:endParaRPr lang="ko-KR" altLang="en-US" sz="1800" dirty="0"/>
+                    </a:p>
+                  </a:txBody>
+                  <a:tcPr/>
+                </a:tc>
+              </a:tr>
+            </a:tbl>
+          </a:graphicData>
+        </a:graphic>
+      </p:graphicFrame>
     </p:spTree>
     <p:extLst>
       <p:ext uri="{BB962C8B-B14F-4D97-AF65-F5344CB8AC3E}">
@@ -10751,282 +11188,6 @@
           </a:p>
         </p:txBody>
       </p:sp>
-      <p:graphicFrame>
-        <p:nvGraphicFramePr>
-          <p:cNvPr id="4" name="내용 개체 틀 3"/>
-          <p:cNvGraphicFramePr>
-            <a:graphicFrameLocks noGrp="1"/>
-          </p:cNvGraphicFramePr>
-          <p:nvPr>
-            <p:ph idx="1"/>
-            <p:extLst>
-              <p:ext uri="{D42A27DB-BD31-4B8C-83A1-F6EECF244321}">
-                <p14:modId xmlns:p14="http://schemas.microsoft.com/office/powerpoint/2010/main" val="3841544946"/>
-              </p:ext>
-            </p:extLst>
-          </p:nvPr>
-        </p:nvGraphicFramePr>
-        <p:xfrm>
-          <a:off x="7092282" y="1444924"/>
-          <a:ext cx="1799558" cy="2560320"/>
-        </p:xfrm>
-        <a:graphic>
-          <a:graphicData uri="http://schemas.openxmlformats.org/drawingml/2006/table">
-            <a:tbl>
-              <a:tblPr firstRow="1" bandRow="1">
-                <a:tableStyleId>{5940675A-B579-460E-94D1-54222C63F5DA}</a:tableStyleId>
-              </a:tblPr>
-              <a:tblGrid>
-                <a:gridCol w="899779"/>
-                <a:gridCol w="899779"/>
-              </a:tblGrid>
-              <a:tr h="0">
-                <a:tc>
-                  <a:txBody>
-                    <a:bodyPr/>
-                    <a:lstStyle/>
-                    <a:p>
-                      <a:pPr algn="ctr" latinLnBrk="1"/>
-                      <a:r>
-                        <a:rPr lang="en-US" altLang="ko-KR" sz="1800" dirty="0" smtClean="0"/>
-                        <a:t>LSN</a:t>
-                      </a:r>
-                      <a:endParaRPr lang="ko-KR" altLang="en-US" sz="1800" dirty="0"/>
-                    </a:p>
-                  </a:txBody>
-                  <a:tcPr>
-                    <a:solidFill>
-                      <a:schemeClr val="accent2"/>
-                    </a:solidFill>
-                  </a:tcPr>
-                </a:tc>
-                <a:tc>
-                  <a:txBody>
-                    <a:bodyPr/>
-                    <a:lstStyle/>
-                    <a:p>
-                      <a:pPr algn="ctr" latinLnBrk="1"/>
-                      <a:r>
-                        <a:rPr lang="en-US" altLang="ko-KR" sz="1800" dirty="0" smtClean="0"/>
-                        <a:t>PSN</a:t>
-                      </a:r>
-                      <a:endParaRPr lang="ko-KR" altLang="en-US" sz="1800" dirty="0"/>
-                    </a:p>
-                  </a:txBody>
-                  <a:tcPr>
-                    <a:solidFill>
-                      <a:schemeClr val="accent2"/>
-                    </a:solidFill>
-                  </a:tcPr>
-                </a:tc>
-              </a:tr>
-              <a:tr h="142321">
-                <a:tc>
-                  <a:txBody>
-                    <a:bodyPr/>
-                    <a:lstStyle/>
-                    <a:p>
-                      <a:pPr algn="ctr" latinLnBrk="1"/>
-                      <a:r>
-                        <a:rPr lang="en-US" altLang="ko-KR" sz="1800" dirty="0" smtClean="0"/>
-                        <a:t>100</a:t>
-                      </a:r>
-                      <a:endParaRPr lang="ko-KR" altLang="en-US" sz="1800" dirty="0"/>
-                    </a:p>
-                  </a:txBody>
-                  <a:tcPr/>
-                </a:tc>
-                <a:tc>
-                  <a:txBody>
-                    <a:bodyPr/>
-                    <a:lstStyle/>
-                    <a:p>
-                      <a:pPr algn="ctr" latinLnBrk="1"/>
-                      <a:r>
-                        <a:rPr lang="en-US" altLang="ko-KR" sz="1800" dirty="0" smtClean="0"/>
-                        <a:t>0x00...</a:t>
-                      </a:r>
-                      <a:endParaRPr lang="ko-KR" altLang="en-US" sz="1800" dirty="0"/>
-                    </a:p>
-                  </a:txBody>
-                  <a:tcPr/>
-                </a:tc>
-              </a:tr>
-              <a:tr h="142321">
-                <a:tc>
-                  <a:txBody>
-                    <a:bodyPr/>
-                    <a:lstStyle/>
-                    <a:p>
-                      <a:pPr algn="ctr" latinLnBrk="1"/>
-                      <a:r>
-                        <a:rPr lang="en-US" altLang="ko-KR" sz="1800" dirty="0" smtClean="0"/>
-                        <a:t>101</a:t>
-                      </a:r>
-                      <a:endParaRPr lang="ko-KR" altLang="en-US" sz="1800" dirty="0"/>
-                    </a:p>
-                  </a:txBody>
-                  <a:tcPr/>
-                </a:tc>
-                <a:tc>
-                  <a:txBody>
-                    <a:bodyPr/>
-                    <a:lstStyle/>
-                    <a:p>
-                      <a:pPr algn="ctr" latinLnBrk="1"/>
-                      <a:r>
-                        <a:rPr lang="en-US" altLang="ko-KR" sz="1800" dirty="0" smtClean="0"/>
-                        <a:t>0x00...</a:t>
-                      </a:r>
-                      <a:endParaRPr lang="ko-KR" altLang="en-US" sz="1800" dirty="0"/>
-                    </a:p>
-                  </a:txBody>
-                  <a:tcPr/>
-                </a:tc>
-              </a:tr>
-              <a:tr h="0">
-                <a:tc gridSpan="2">
-                  <a:txBody>
-                    <a:bodyPr/>
-                    <a:lstStyle/>
-                    <a:p>
-                      <a:pPr algn="ctr" latinLnBrk="1"/>
-                      <a:r>
-                        <a:rPr lang="en-US" altLang="ko-KR" sz="1800" dirty="0" smtClean="0"/>
-                        <a:t>.....</a:t>
-                      </a:r>
-                      <a:endParaRPr lang="ko-KR" altLang="en-US" sz="1800" dirty="0"/>
-                    </a:p>
-                  </a:txBody>
-                  <a:tcPr>
-                    <a:lnL w="12700" cap="flat" cmpd="sng" algn="ctr">
-                      <a:noFill/>
-                      <a:prstDash val="solid"/>
-                      <a:round/>
-                      <a:headEnd type="none" w="med" len="med"/>
-                      <a:tailEnd type="none" w="med" len="med"/>
-                    </a:lnL>
-                    <a:lnR w="12700" cap="flat" cmpd="sng" algn="ctr">
-                      <a:noFill/>
-                      <a:prstDash val="solid"/>
-                      <a:round/>
-                      <a:headEnd type="none" w="med" len="med"/>
-                      <a:tailEnd type="none" w="med" len="med"/>
-                    </a:lnR>
-                  </a:tcPr>
-                </a:tc>
-                <a:tc hMerge="1">
-                  <a:txBody>
-                    <a:bodyPr/>
-                    <a:lstStyle/>
-                    <a:p>
-                      <a:pPr algn="ctr" latinLnBrk="1"/>
-                      <a:endParaRPr lang="ko-KR" altLang="en-US" dirty="0"/>
-                    </a:p>
-                  </a:txBody>
-                  <a:tcPr/>
-                </a:tc>
-              </a:tr>
-              <a:tr h="142321">
-                <a:tc>
-                  <a:txBody>
-                    <a:bodyPr/>
-                    <a:lstStyle/>
-                    <a:p>
-                      <a:pPr algn="ctr" latinLnBrk="1"/>
-                      <a:r>
-                        <a:rPr lang="en-US" altLang="ko-KR" sz="1800" dirty="0" smtClean="0"/>
-                        <a:t>20</a:t>
-                      </a:r>
-                      <a:endParaRPr lang="ko-KR" altLang="en-US" sz="1800" dirty="0"/>
-                    </a:p>
-                  </a:txBody>
-                  <a:tcPr/>
-                </a:tc>
-                <a:tc>
-                  <a:txBody>
-                    <a:bodyPr/>
-                    <a:lstStyle/>
-                    <a:p>
-                      <a:pPr algn="ctr" latinLnBrk="1"/>
-                      <a:r>
-                        <a:rPr lang="en-US" altLang="ko-KR" sz="1800" dirty="0" smtClean="0"/>
-                        <a:t>0x00...</a:t>
-                      </a:r>
-                      <a:endParaRPr lang="ko-KR" altLang="en-US" sz="1800" dirty="0"/>
-                    </a:p>
-                  </a:txBody>
-                  <a:tcPr/>
-                </a:tc>
-              </a:tr>
-              <a:tr h="142321">
-                <a:tc>
-                  <a:txBody>
-                    <a:bodyPr/>
-                    <a:lstStyle/>
-                    <a:p>
-                      <a:pPr algn="ctr" latinLnBrk="1"/>
-                      <a:r>
-                        <a:rPr lang="en-US" altLang="ko-KR" sz="1800" dirty="0" smtClean="0"/>
-                        <a:t>21</a:t>
-                      </a:r>
-                      <a:endParaRPr lang="ko-KR" altLang="en-US" sz="1800" dirty="0"/>
-                    </a:p>
-                  </a:txBody>
-                  <a:tcPr/>
-                </a:tc>
-                <a:tc>
-                  <a:txBody>
-                    <a:bodyPr/>
-                    <a:lstStyle/>
-                    <a:p>
-                      <a:pPr algn="ctr" latinLnBrk="1"/>
-                      <a:r>
-                        <a:rPr lang="en-US" altLang="ko-KR" sz="1800" dirty="0" smtClean="0"/>
-                        <a:t>0x00...</a:t>
-                      </a:r>
-                      <a:endParaRPr lang="ko-KR" altLang="en-US" sz="1800" dirty="0"/>
-                    </a:p>
-                  </a:txBody>
-                  <a:tcPr/>
-                </a:tc>
-              </a:tr>
-              <a:tr h="142321">
-                <a:tc>
-                  <a:txBody>
-                    <a:bodyPr/>
-                    <a:lstStyle/>
-                    <a:p>
-                      <a:pPr algn="ctr" latinLnBrk="1"/>
-                      <a:r>
-                        <a:rPr lang="en-US" altLang="ko-KR" sz="1800" dirty="0" smtClean="0"/>
-                        <a:t>22</a:t>
-                      </a:r>
-                      <a:endParaRPr lang="ko-KR" altLang="en-US" sz="1800" dirty="0"/>
-                    </a:p>
-                  </a:txBody>
-                  <a:tcPr/>
-                </a:tc>
-                <a:tc>
-                  <a:txBody>
-                    <a:bodyPr/>
-                    <a:lstStyle/>
-                    <a:p>
-                      <a:pPr algn="ctr" latinLnBrk="1"/>
-                      <a:r>
-                        <a:rPr lang="en-US" altLang="ko-KR" sz="1800" dirty="0" smtClean="0"/>
-                        <a:t>0x00...</a:t>
-                      </a:r>
-                      <a:endParaRPr lang="ko-KR" altLang="en-US" sz="1800" dirty="0"/>
-                    </a:p>
-                  </a:txBody>
-                  <a:tcPr/>
-                </a:tc>
-              </a:tr>
-            </a:tbl>
-          </a:graphicData>
-        </a:graphic>
-      </p:graphicFrame>
       <p:sp>
         <p:nvSpPr>
           <p:cNvPr id="5" name="TextBox 4"/>
@@ -11974,6 +12135,302 @@
           </a:p>
         </p:txBody>
       </p:sp>
+      <p:graphicFrame>
+        <p:nvGraphicFramePr>
+          <p:cNvPr id="18" name="내용 개체 틀 3"/>
+          <p:cNvGraphicFramePr>
+            <a:graphicFrameLocks noGrp="1"/>
+          </p:cNvGraphicFramePr>
+          <p:nvPr>
+            <p:ph idx="1"/>
+            <p:extLst>
+              <p:ext uri="{D42A27DB-BD31-4B8C-83A1-F6EECF244321}">
+                <p14:modId xmlns:p14="http://schemas.microsoft.com/office/powerpoint/2010/main" val="2590090607"/>
+              </p:ext>
+            </p:extLst>
+          </p:nvPr>
+        </p:nvGraphicFramePr>
+        <p:xfrm>
+          <a:off x="7092282" y="1444925"/>
+          <a:ext cx="1799558" cy="2560320"/>
+        </p:xfrm>
+        <a:graphic>
+          <a:graphicData uri="http://schemas.openxmlformats.org/drawingml/2006/table">
+            <a:tbl>
+              <a:tblPr firstRow="1" bandRow="1">
+                <a:tableStyleId>{5940675A-B579-460E-94D1-54222C63F5DA}</a:tableStyleId>
+              </a:tblPr>
+              <a:tblGrid>
+                <a:gridCol w="899779"/>
+                <a:gridCol w="899779"/>
+              </a:tblGrid>
+              <a:tr h="149143">
+                <a:tc>
+                  <a:txBody>
+                    <a:bodyPr/>
+                    <a:lstStyle/>
+                    <a:p>
+                      <a:pPr algn="ctr" latinLnBrk="1"/>
+                      <a:r>
+                        <a:rPr lang="en-US" altLang="ko-KR" sz="1800" dirty="0" smtClean="0"/>
+                        <a:t>LSN</a:t>
+                      </a:r>
+                      <a:endParaRPr lang="ko-KR" altLang="en-US" sz="1800" dirty="0"/>
+                    </a:p>
+                  </a:txBody>
+                  <a:tcPr>
+                    <a:solidFill>
+                      <a:schemeClr val="accent2"/>
+                    </a:solidFill>
+                  </a:tcPr>
+                </a:tc>
+                <a:tc>
+                  <a:txBody>
+                    <a:bodyPr/>
+                    <a:lstStyle/>
+                    <a:p>
+                      <a:pPr algn="ctr" latinLnBrk="1"/>
+                      <a:r>
+                        <a:rPr lang="en-US" altLang="ko-KR" sz="1800" dirty="0" smtClean="0"/>
+                        <a:t>PSN</a:t>
+                      </a:r>
+                      <a:endParaRPr lang="ko-KR" altLang="en-US" sz="1800" dirty="0"/>
+                    </a:p>
+                  </a:txBody>
+                  <a:tcPr>
+                    <a:solidFill>
+                      <a:schemeClr val="accent2"/>
+                    </a:solidFill>
+                  </a:tcPr>
+                </a:tc>
+              </a:tr>
+              <a:tr h="168713">
+                <a:tc>
+                  <a:txBody>
+                    <a:bodyPr/>
+                    <a:lstStyle/>
+                    <a:p>
+                      <a:pPr algn="ctr" latinLnBrk="1"/>
+                      <a:r>
+                        <a:rPr lang="en-US" altLang="ko-KR" sz="1800" dirty="0" smtClean="0"/>
+                        <a:t>20</a:t>
+                      </a:r>
+                      <a:endParaRPr lang="ko-KR" altLang="en-US" sz="1800" dirty="0"/>
+                    </a:p>
+                  </a:txBody>
+                  <a:tcPr/>
+                </a:tc>
+                <a:tc>
+                  <a:txBody>
+                    <a:bodyPr/>
+                    <a:lstStyle/>
+                    <a:p>
+                      <a:pPr algn="ctr" latinLnBrk="1"/>
+                      <a:r>
+                        <a:rPr lang="en-US" altLang="ko-KR" sz="1800" dirty="0" smtClean="0"/>
+                        <a:t>0x00</a:t>
+                      </a:r>
+                      <a:r>
+                        <a:rPr lang="en-US" altLang="ko-KR" sz="1800" dirty="0" smtClean="0"/>
+                        <a:t>...</a:t>
+                      </a:r>
+                      <a:endParaRPr lang="ko-KR" altLang="en-US" sz="1800" dirty="0"/>
+                    </a:p>
+                  </a:txBody>
+                  <a:tcPr/>
+                </a:tc>
+              </a:tr>
+              <a:tr h="168713">
+                <a:tc>
+                  <a:txBody>
+                    <a:bodyPr/>
+                    <a:lstStyle/>
+                    <a:p>
+                      <a:pPr algn="ctr" latinLnBrk="1"/>
+                      <a:r>
+                        <a:rPr lang="en-US" altLang="ko-KR" sz="1800" dirty="0" smtClean="0"/>
+                        <a:t>21</a:t>
+                      </a:r>
+                      <a:endParaRPr lang="ko-KR" altLang="en-US" sz="1800" dirty="0"/>
+                    </a:p>
+                  </a:txBody>
+                  <a:tcPr/>
+                </a:tc>
+                <a:tc>
+                  <a:txBody>
+                    <a:bodyPr/>
+                    <a:lstStyle/>
+                    <a:p>
+                      <a:pPr algn="ctr" latinLnBrk="1"/>
+                      <a:r>
+                        <a:rPr lang="en-US" altLang="ko-KR" sz="1800" dirty="0" smtClean="0"/>
+                        <a:t>0x00</a:t>
+                      </a:r>
+                      <a:r>
+                        <a:rPr lang="en-US" altLang="ko-KR" sz="1800" dirty="0" smtClean="0"/>
+                        <a:t>…</a:t>
+                      </a:r>
+                      <a:endParaRPr lang="ko-KR" altLang="en-US" sz="1800" dirty="0"/>
+                    </a:p>
+                  </a:txBody>
+                  <a:tcPr/>
+                </a:tc>
+              </a:tr>
+              <a:tr h="168713">
+                <a:tc>
+                  <a:txBody>
+                    <a:bodyPr/>
+                    <a:lstStyle/>
+                    <a:p>
+                      <a:pPr algn="ctr" latinLnBrk="1"/>
+                      <a:r>
+                        <a:rPr lang="en-US" altLang="ko-KR" sz="1800" dirty="0" smtClean="0"/>
+                        <a:t>22</a:t>
+                      </a:r>
+                      <a:endParaRPr lang="ko-KR" altLang="en-US" sz="1800" dirty="0"/>
+                    </a:p>
+                  </a:txBody>
+                  <a:tcPr/>
+                </a:tc>
+                <a:tc>
+                  <a:txBody>
+                    <a:bodyPr/>
+                    <a:lstStyle/>
+                    <a:p>
+                      <a:pPr algn="ctr" latinLnBrk="1"/>
+                      <a:r>
+                        <a:rPr lang="en-US" altLang="ko-KR" sz="1800" dirty="0" smtClean="0"/>
+                        <a:t>0x00</a:t>
+                      </a:r>
+                      <a:r>
+                        <a:rPr lang="en-US" altLang="ko-KR" sz="1800" dirty="0" smtClean="0"/>
+                        <a:t>…</a:t>
+                      </a:r>
+                      <a:endParaRPr lang="ko-KR" altLang="en-US" sz="1800" dirty="0"/>
+                    </a:p>
+                  </a:txBody>
+                  <a:tcPr/>
+                </a:tc>
+              </a:tr>
+              <a:tr h="149143">
+                <a:tc gridSpan="2">
+                  <a:txBody>
+                    <a:bodyPr/>
+                    <a:lstStyle/>
+                    <a:p>
+                      <a:pPr algn="ctr" latinLnBrk="1"/>
+                      <a:r>
+                        <a:rPr lang="en-US" altLang="ko-KR" sz="1800" dirty="0" smtClean="0"/>
+                        <a:t>.....</a:t>
+                      </a:r>
+                      <a:endParaRPr lang="ko-KR" altLang="en-US" sz="1800" dirty="0"/>
+                    </a:p>
+                  </a:txBody>
+                  <a:tcPr>
+                    <a:lnL w="12700" cap="flat" cmpd="sng" algn="ctr">
+                      <a:noFill/>
+                      <a:prstDash val="solid"/>
+                      <a:round/>
+                      <a:headEnd type="none" w="med" len="med"/>
+                      <a:tailEnd type="none" w="med" len="med"/>
+                    </a:lnL>
+                    <a:lnR w="12700" cap="flat" cmpd="sng" algn="ctr">
+                      <a:noFill/>
+                      <a:prstDash val="solid"/>
+                      <a:round/>
+                      <a:headEnd type="none" w="med" len="med"/>
+                      <a:tailEnd type="none" w="med" len="med"/>
+                    </a:lnR>
+                  </a:tcPr>
+                </a:tc>
+                <a:tc hMerge="1">
+                  <a:txBody>
+                    <a:bodyPr/>
+                    <a:lstStyle/>
+                    <a:p>
+                      <a:pPr algn="ctr" latinLnBrk="1"/>
+                      <a:endParaRPr lang="ko-KR" altLang="en-US" dirty="0"/>
+                    </a:p>
+                  </a:txBody>
+                  <a:tcPr/>
+                </a:tc>
+              </a:tr>
+              <a:tr h="168713">
+                <a:tc>
+                  <a:txBody>
+                    <a:bodyPr/>
+                    <a:lstStyle/>
+                    <a:p>
+                      <a:pPr algn="ctr" latinLnBrk="1"/>
+                      <a:r>
+                        <a:rPr lang="en-US" altLang="ko-KR" sz="1800" dirty="0" smtClean="0"/>
+                        <a:t>100</a:t>
+                      </a:r>
+                      <a:endParaRPr lang="ko-KR" altLang="en-US" sz="1800" dirty="0"/>
+                    </a:p>
+                  </a:txBody>
+                  <a:tcPr/>
+                </a:tc>
+                <a:tc>
+                  <a:txBody>
+                    <a:bodyPr/>
+                    <a:lstStyle/>
+                    <a:p>
+                      <a:pPr algn="ctr" latinLnBrk="1"/>
+                      <a:r>
+                        <a:rPr lang="en-US" altLang="ko-KR" sz="1800" dirty="0" smtClean="0"/>
+                        <a:t>0x00</a:t>
+                      </a:r>
+                      <a:r>
+                        <a:rPr lang="en-US" altLang="ko-KR" sz="1800" dirty="0" smtClean="0"/>
+                        <a:t>…</a:t>
+                      </a:r>
+                      <a:endParaRPr lang="ko-KR" altLang="en-US" sz="1800" dirty="0"/>
+                    </a:p>
+                  </a:txBody>
+                  <a:tcPr/>
+                </a:tc>
+              </a:tr>
+              <a:tr h="168713">
+                <a:tc>
+                  <a:txBody>
+                    <a:bodyPr/>
+                    <a:lstStyle/>
+                    <a:p>
+                      <a:pPr algn="ctr" latinLnBrk="1"/>
+                      <a:r>
+                        <a:rPr lang="en-US" altLang="ko-KR" sz="1800" dirty="0" smtClean="0"/>
+                        <a:t>101</a:t>
+                      </a:r>
+                      <a:endParaRPr lang="ko-KR" altLang="en-US" sz="1800" dirty="0"/>
+                    </a:p>
+                  </a:txBody>
+                  <a:tcPr/>
+                </a:tc>
+                <a:tc>
+                  <a:txBody>
+                    <a:bodyPr/>
+                    <a:lstStyle/>
+                    <a:p>
+                      <a:pPr algn="ctr" latinLnBrk="1"/>
+                      <a:r>
+                        <a:rPr lang="en-US" altLang="ko-KR" sz="1800" dirty="0" smtClean="0"/>
+                        <a:t>0x00</a:t>
+                      </a:r>
+                      <a:r>
+                        <a:rPr lang="en-US" altLang="ko-KR" sz="1800" dirty="0" smtClean="0"/>
+                        <a:t>…</a:t>
+                      </a:r>
+                      <a:endParaRPr lang="ko-KR" altLang="en-US" sz="1800" dirty="0"/>
+                    </a:p>
+                  </a:txBody>
+                  <a:tcPr/>
+                </a:tc>
+              </a:tr>
+            </a:tbl>
+          </a:graphicData>
+        </a:graphic>
+      </p:graphicFrame>
     </p:spTree>
     <p:extLst>
       <p:ext uri="{BB962C8B-B14F-4D97-AF65-F5344CB8AC3E}">
@@ -12063,281 +12520,6 @@
           </a:p>
         </p:txBody>
       </p:sp>
-      <p:graphicFrame>
-        <p:nvGraphicFramePr>
-          <p:cNvPr id="5" name="내용 개체 틀 3"/>
-          <p:cNvGraphicFramePr>
-            <a:graphicFrameLocks/>
-          </p:cNvGraphicFramePr>
-          <p:nvPr>
-            <p:extLst>
-              <p:ext uri="{D42A27DB-BD31-4B8C-83A1-F6EECF244321}">
-                <p14:modId xmlns:p14="http://schemas.microsoft.com/office/powerpoint/2010/main" val="223048905"/>
-              </p:ext>
-            </p:extLst>
-          </p:nvPr>
-        </p:nvGraphicFramePr>
-        <p:xfrm>
-          <a:off x="2483770" y="2345146"/>
-          <a:ext cx="1799558" cy="2560320"/>
-        </p:xfrm>
-        <a:graphic>
-          <a:graphicData uri="http://schemas.openxmlformats.org/drawingml/2006/table">
-            <a:tbl>
-              <a:tblPr firstRow="1" bandRow="1">
-                <a:tableStyleId>{5940675A-B579-460E-94D1-54222C63F5DA}</a:tableStyleId>
-              </a:tblPr>
-              <a:tblGrid>
-                <a:gridCol w="899779"/>
-                <a:gridCol w="899779"/>
-              </a:tblGrid>
-              <a:tr h="0">
-                <a:tc>
-                  <a:txBody>
-                    <a:bodyPr/>
-                    <a:lstStyle/>
-                    <a:p>
-                      <a:pPr algn="ctr" latinLnBrk="1"/>
-                      <a:r>
-                        <a:rPr lang="en-US" altLang="ko-KR" sz="1800" dirty="0" smtClean="0"/>
-                        <a:t>LSN</a:t>
-                      </a:r>
-                      <a:endParaRPr lang="ko-KR" altLang="en-US" sz="1800" dirty="0"/>
-                    </a:p>
-                  </a:txBody>
-                  <a:tcPr>
-                    <a:solidFill>
-                      <a:schemeClr val="accent2"/>
-                    </a:solidFill>
-                  </a:tcPr>
-                </a:tc>
-                <a:tc>
-                  <a:txBody>
-                    <a:bodyPr/>
-                    <a:lstStyle/>
-                    <a:p>
-                      <a:pPr algn="ctr" latinLnBrk="1"/>
-                      <a:r>
-                        <a:rPr lang="en-US" altLang="ko-KR" sz="1800" dirty="0" smtClean="0"/>
-                        <a:t>PSN</a:t>
-                      </a:r>
-                      <a:endParaRPr lang="ko-KR" altLang="en-US" sz="1800" dirty="0"/>
-                    </a:p>
-                  </a:txBody>
-                  <a:tcPr>
-                    <a:solidFill>
-                      <a:schemeClr val="accent2"/>
-                    </a:solidFill>
-                  </a:tcPr>
-                </a:tc>
-              </a:tr>
-              <a:tr h="146512">
-                <a:tc>
-                  <a:txBody>
-                    <a:bodyPr/>
-                    <a:lstStyle/>
-                    <a:p>
-                      <a:pPr algn="ctr" latinLnBrk="1"/>
-                      <a:r>
-                        <a:rPr lang="en-US" altLang="ko-KR" sz="1800" dirty="0" smtClean="0"/>
-                        <a:t>100</a:t>
-                      </a:r>
-                      <a:endParaRPr lang="ko-KR" altLang="en-US" sz="1800" dirty="0"/>
-                    </a:p>
-                  </a:txBody>
-                  <a:tcPr/>
-                </a:tc>
-                <a:tc>
-                  <a:txBody>
-                    <a:bodyPr/>
-                    <a:lstStyle/>
-                    <a:p>
-                      <a:pPr algn="ctr" latinLnBrk="1"/>
-                      <a:r>
-                        <a:rPr lang="en-US" altLang="ko-KR" sz="1800" dirty="0" smtClean="0"/>
-                        <a:t>0x80...</a:t>
-                      </a:r>
-                      <a:endParaRPr lang="ko-KR" altLang="en-US" sz="1800" dirty="0"/>
-                    </a:p>
-                  </a:txBody>
-                  <a:tcPr/>
-                </a:tc>
-              </a:tr>
-              <a:tr h="146512">
-                <a:tc>
-                  <a:txBody>
-                    <a:bodyPr/>
-                    <a:lstStyle/>
-                    <a:p>
-                      <a:pPr algn="ctr" latinLnBrk="1"/>
-                      <a:r>
-                        <a:rPr lang="en-US" altLang="ko-KR" sz="1800" dirty="0" smtClean="0"/>
-                        <a:t>101</a:t>
-                      </a:r>
-                      <a:endParaRPr lang="ko-KR" altLang="en-US" sz="1800" dirty="0"/>
-                    </a:p>
-                  </a:txBody>
-                  <a:tcPr/>
-                </a:tc>
-                <a:tc>
-                  <a:txBody>
-                    <a:bodyPr/>
-                    <a:lstStyle/>
-                    <a:p>
-                      <a:pPr algn="ctr" latinLnBrk="1"/>
-                      <a:r>
-                        <a:rPr lang="en-US" altLang="ko-KR" sz="1800" dirty="0" smtClean="0"/>
-                        <a:t>0x80...</a:t>
-                      </a:r>
-                      <a:endParaRPr lang="ko-KR" altLang="en-US" sz="1800" dirty="0"/>
-                    </a:p>
-                  </a:txBody>
-                  <a:tcPr/>
-                </a:tc>
-              </a:tr>
-              <a:tr h="0">
-                <a:tc gridSpan="2">
-                  <a:txBody>
-                    <a:bodyPr/>
-                    <a:lstStyle/>
-                    <a:p>
-                      <a:pPr algn="ctr" latinLnBrk="1"/>
-                      <a:r>
-                        <a:rPr lang="en-US" altLang="ko-KR" sz="1800" dirty="0" smtClean="0"/>
-                        <a:t>.....</a:t>
-                      </a:r>
-                      <a:endParaRPr lang="ko-KR" altLang="en-US" sz="1800" dirty="0"/>
-                    </a:p>
-                  </a:txBody>
-                  <a:tcPr>
-                    <a:lnL w="12700" cap="flat" cmpd="sng" algn="ctr">
-                      <a:noFill/>
-                      <a:prstDash val="solid"/>
-                      <a:round/>
-                      <a:headEnd type="none" w="med" len="med"/>
-                      <a:tailEnd type="none" w="med" len="med"/>
-                    </a:lnL>
-                    <a:lnR w="12700" cap="flat" cmpd="sng" algn="ctr">
-                      <a:noFill/>
-                      <a:prstDash val="solid"/>
-                      <a:round/>
-                      <a:headEnd type="none" w="med" len="med"/>
-                      <a:tailEnd type="none" w="med" len="med"/>
-                    </a:lnR>
-                  </a:tcPr>
-                </a:tc>
-                <a:tc hMerge="1">
-                  <a:txBody>
-                    <a:bodyPr/>
-                    <a:lstStyle/>
-                    <a:p>
-                      <a:pPr algn="ctr" latinLnBrk="1"/>
-                      <a:endParaRPr lang="ko-KR" altLang="en-US" dirty="0"/>
-                    </a:p>
-                  </a:txBody>
-                  <a:tcPr/>
-                </a:tc>
-              </a:tr>
-              <a:tr h="146512">
-                <a:tc>
-                  <a:txBody>
-                    <a:bodyPr/>
-                    <a:lstStyle/>
-                    <a:p>
-                      <a:pPr algn="ctr" latinLnBrk="1"/>
-                      <a:r>
-                        <a:rPr lang="en-US" altLang="ko-KR" sz="1800" dirty="0" smtClean="0"/>
-                        <a:t>20</a:t>
-                      </a:r>
-                      <a:endParaRPr lang="ko-KR" altLang="en-US" sz="1800" dirty="0"/>
-                    </a:p>
-                  </a:txBody>
-                  <a:tcPr/>
-                </a:tc>
-                <a:tc>
-                  <a:txBody>
-                    <a:bodyPr/>
-                    <a:lstStyle/>
-                    <a:p>
-                      <a:pPr algn="ctr" latinLnBrk="1"/>
-                      <a:r>
-                        <a:rPr lang="en-US" altLang="ko-KR" sz="1800" dirty="0" smtClean="0"/>
-                        <a:t>0x00...</a:t>
-                      </a:r>
-                      <a:endParaRPr lang="ko-KR" altLang="en-US" sz="1800" dirty="0"/>
-                    </a:p>
-                  </a:txBody>
-                  <a:tcPr/>
-                </a:tc>
-              </a:tr>
-              <a:tr h="146512">
-                <a:tc>
-                  <a:txBody>
-                    <a:bodyPr/>
-                    <a:lstStyle/>
-                    <a:p>
-                      <a:pPr algn="ctr" latinLnBrk="1"/>
-                      <a:r>
-                        <a:rPr lang="en-US" altLang="ko-KR" sz="1800" dirty="0" smtClean="0"/>
-                        <a:t>21</a:t>
-                      </a:r>
-                      <a:endParaRPr lang="ko-KR" altLang="en-US" sz="1800" dirty="0"/>
-                    </a:p>
-                  </a:txBody>
-                  <a:tcPr/>
-                </a:tc>
-                <a:tc>
-                  <a:txBody>
-                    <a:bodyPr/>
-                    <a:lstStyle/>
-                    <a:p>
-                      <a:pPr algn="ctr" latinLnBrk="1"/>
-                      <a:r>
-                        <a:rPr lang="en-US" altLang="ko-KR" sz="1800" dirty="0" smtClean="0"/>
-                        <a:t>0x00...</a:t>
-                      </a:r>
-                      <a:endParaRPr lang="ko-KR" altLang="en-US" sz="1800" dirty="0"/>
-                    </a:p>
-                  </a:txBody>
-                  <a:tcPr/>
-                </a:tc>
-              </a:tr>
-              <a:tr h="146512">
-                <a:tc>
-                  <a:txBody>
-                    <a:bodyPr/>
-                    <a:lstStyle/>
-                    <a:p>
-                      <a:pPr algn="ctr" latinLnBrk="1"/>
-                      <a:r>
-                        <a:rPr lang="en-US" altLang="ko-KR" sz="1800" dirty="0" smtClean="0"/>
-                        <a:t>22</a:t>
-                      </a:r>
-                      <a:endParaRPr lang="ko-KR" altLang="en-US" sz="1800" dirty="0"/>
-                    </a:p>
-                  </a:txBody>
-                  <a:tcPr/>
-                </a:tc>
-                <a:tc>
-                  <a:txBody>
-                    <a:bodyPr/>
-                    <a:lstStyle/>
-                    <a:p>
-                      <a:pPr algn="ctr" latinLnBrk="1"/>
-                      <a:r>
-                        <a:rPr lang="en-US" altLang="ko-KR" sz="1800" dirty="0" smtClean="0"/>
-                        <a:t>0x00...</a:t>
-                      </a:r>
-                      <a:endParaRPr lang="ko-KR" altLang="en-US" sz="1800" dirty="0"/>
-                    </a:p>
-                  </a:txBody>
-                  <a:tcPr/>
-                </a:tc>
-              </a:tr>
-            </a:tbl>
-          </a:graphicData>
-        </a:graphic>
-      </p:graphicFrame>
       <p:sp>
         <p:nvSpPr>
           <p:cNvPr id="6" name="TextBox 5"/>
@@ -13270,6 +13452,294 @@
           </a:p>
         </p:txBody>
       </p:sp>
+      <p:graphicFrame>
+        <p:nvGraphicFramePr>
+          <p:cNvPr id="19" name="내용 개체 틀 3"/>
+          <p:cNvGraphicFramePr>
+            <a:graphicFrameLocks noGrp="1"/>
+          </p:cNvGraphicFramePr>
+          <p:nvPr>
+            <p:ph idx="1"/>
+            <p:extLst>
+              <p:ext uri="{D42A27DB-BD31-4B8C-83A1-F6EECF244321}">
+                <p14:modId xmlns:p14="http://schemas.microsoft.com/office/powerpoint/2010/main" val="717249094"/>
+              </p:ext>
+            </p:extLst>
+          </p:nvPr>
+        </p:nvGraphicFramePr>
+        <p:xfrm>
+          <a:off x="2555776" y="2492896"/>
+          <a:ext cx="1799558" cy="2560320"/>
+        </p:xfrm>
+        <a:graphic>
+          <a:graphicData uri="http://schemas.openxmlformats.org/drawingml/2006/table">
+            <a:tbl>
+              <a:tblPr firstRow="1" bandRow="1">
+                <a:tableStyleId>{5940675A-B579-460E-94D1-54222C63F5DA}</a:tableStyleId>
+              </a:tblPr>
+              <a:tblGrid>
+                <a:gridCol w="899779"/>
+                <a:gridCol w="899779"/>
+              </a:tblGrid>
+              <a:tr h="149143">
+                <a:tc>
+                  <a:txBody>
+                    <a:bodyPr/>
+                    <a:lstStyle/>
+                    <a:p>
+                      <a:pPr algn="ctr" latinLnBrk="1"/>
+                      <a:r>
+                        <a:rPr lang="en-US" altLang="ko-KR" sz="1800" dirty="0" smtClean="0"/>
+                        <a:t>LSN</a:t>
+                      </a:r>
+                      <a:endParaRPr lang="ko-KR" altLang="en-US" sz="1800" dirty="0"/>
+                    </a:p>
+                  </a:txBody>
+                  <a:tcPr>
+                    <a:solidFill>
+                      <a:schemeClr val="accent2"/>
+                    </a:solidFill>
+                  </a:tcPr>
+                </a:tc>
+                <a:tc>
+                  <a:txBody>
+                    <a:bodyPr/>
+                    <a:lstStyle/>
+                    <a:p>
+                      <a:pPr algn="ctr" latinLnBrk="1"/>
+                      <a:r>
+                        <a:rPr lang="en-US" altLang="ko-KR" sz="1800" dirty="0" smtClean="0"/>
+                        <a:t>PSN</a:t>
+                      </a:r>
+                      <a:endParaRPr lang="ko-KR" altLang="en-US" sz="1800" dirty="0"/>
+                    </a:p>
+                  </a:txBody>
+                  <a:tcPr>
+                    <a:solidFill>
+                      <a:schemeClr val="accent2"/>
+                    </a:solidFill>
+                  </a:tcPr>
+                </a:tc>
+              </a:tr>
+              <a:tr h="168713">
+                <a:tc>
+                  <a:txBody>
+                    <a:bodyPr/>
+                    <a:lstStyle/>
+                    <a:p>
+                      <a:pPr algn="ctr" latinLnBrk="1"/>
+                      <a:r>
+                        <a:rPr lang="en-US" altLang="ko-KR" sz="1800" dirty="0" smtClean="0"/>
+                        <a:t>20</a:t>
+                      </a:r>
+                      <a:endParaRPr lang="ko-KR" altLang="en-US" sz="1800" dirty="0"/>
+                    </a:p>
+                  </a:txBody>
+                  <a:tcPr/>
+                </a:tc>
+                <a:tc>
+                  <a:txBody>
+                    <a:bodyPr/>
+                    <a:lstStyle/>
+                    <a:p>
+                      <a:pPr algn="ctr" latinLnBrk="1"/>
+                      <a:r>
+                        <a:rPr lang="en-US" altLang="ko-KR" sz="1800" dirty="0" smtClean="0"/>
+                        <a:t>0x00</a:t>
+                      </a:r>
+                      <a:r>
+                        <a:rPr lang="en-US" altLang="ko-KR" sz="1800" dirty="0" smtClean="0"/>
+                        <a:t>...</a:t>
+                      </a:r>
+                      <a:endParaRPr lang="ko-KR" altLang="en-US" sz="1800" dirty="0"/>
+                    </a:p>
+                  </a:txBody>
+                  <a:tcPr/>
+                </a:tc>
+              </a:tr>
+              <a:tr h="168713">
+                <a:tc>
+                  <a:txBody>
+                    <a:bodyPr/>
+                    <a:lstStyle/>
+                    <a:p>
+                      <a:pPr algn="ctr" latinLnBrk="1"/>
+                      <a:r>
+                        <a:rPr lang="en-US" altLang="ko-KR" sz="1800" dirty="0" smtClean="0"/>
+                        <a:t>21</a:t>
+                      </a:r>
+                      <a:endParaRPr lang="ko-KR" altLang="en-US" sz="1800" dirty="0"/>
+                    </a:p>
+                  </a:txBody>
+                  <a:tcPr/>
+                </a:tc>
+                <a:tc>
+                  <a:txBody>
+                    <a:bodyPr/>
+                    <a:lstStyle/>
+                    <a:p>
+                      <a:pPr algn="ctr" latinLnBrk="1"/>
+                      <a:r>
+                        <a:rPr lang="en-US" altLang="ko-KR" sz="1800" dirty="0" smtClean="0"/>
+                        <a:t>0x00</a:t>
+                      </a:r>
+                      <a:r>
+                        <a:rPr lang="en-US" altLang="ko-KR" sz="1800" dirty="0" smtClean="0"/>
+                        <a:t>...</a:t>
+                      </a:r>
+                      <a:endParaRPr lang="ko-KR" altLang="en-US" sz="1800" dirty="0"/>
+                    </a:p>
+                  </a:txBody>
+                  <a:tcPr/>
+                </a:tc>
+              </a:tr>
+              <a:tr h="168713">
+                <a:tc>
+                  <a:txBody>
+                    <a:bodyPr/>
+                    <a:lstStyle/>
+                    <a:p>
+                      <a:pPr algn="ctr" latinLnBrk="1"/>
+                      <a:r>
+                        <a:rPr lang="en-US" altLang="ko-KR" sz="1800" dirty="0" smtClean="0"/>
+                        <a:t>22</a:t>
+                      </a:r>
+                      <a:endParaRPr lang="ko-KR" altLang="en-US" sz="1800" dirty="0"/>
+                    </a:p>
+                  </a:txBody>
+                  <a:tcPr/>
+                </a:tc>
+                <a:tc>
+                  <a:txBody>
+                    <a:bodyPr/>
+                    <a:lstStyle/>
+                    <a:p>
+                      <a:pPr algn="ctr" latinLnBrk="1"/>
+                      <a:r>
+                        <a:rPr lang="en-US" altLang="ko-KR" sz="1800" dirty="0" smtClean="0"/>
+                        <a:t>0x00</a:t>
+                      </a:r>
+                      <a:r>
+                        <a:rPr lang="en-US" altLang="ko-KR" sz="1800" dirty="0" smtClean="0"/>
+                        <a:t>…</a:t>
+                      </a:r>
+                      <a:endParaRPr lang="ko-KR" altLang="en-US" sz="1800" dirty="0"/>
+                    </a:p>
+                  </a:txBody>
+                  <a:tcPr/>
+                </a:tc>
+              </a:tr>
+              <a:tr h="149143">
+                <a:tc gridSpan="2">
+                  <a:txBody>
+                    <a:bodyPr/>
+                    <a:lstStyle/>
+                    <a:p>
+                      <a:pPr algn="ctr" latinLnBrk="1"/>
+                      <a:r>
+                        <a:rPr lang="en-US" altLang="ko-KR" sz="1800" dirty="0" smtClean="0"/>
+                        <a:t>.....</a:t>
+                      </a:r>
+                      <a:endParaRPr lang="ko-KR" altLang="en-US" sz="1800" dirty="0"/>
+                    </a:p>
+                  </a:txBody>
+                  <a:tcPr>
+                    <a:lnL w="12700" cap="flat" cmpd="sng" algn="ctr">
+                      <a:noFill/>
+                      <a:prstDash val="solid"/>
+                      <a:round/>
+                      <a:headEnd type="none" w="med" len="med"/>
+                      <a:tailEnd type="none" w="med" len="med"/>
+                    </a:lnL>
+                    <a:lnR w="12700" cap="flat" cmpd="sng" algn="ctr">
+                      <a:noFill/>
+                      <a:prstDash val="solid"/>
+                      <a:round/>
+                      <a:headEnd type="none" w="med" len="med"/>
+                      <a:tailEnd type="none" w="med" len="med"/>
+                    </a:lnR>
+                  </a:tcPr>
+                </a:tc>
+                <a:tc hMerge="1">
+                  <a:txBody>
+                    <a:bodyPr/>
+                    <a:lstStyle/>
+                    <a:p>
+                      <a:pPr algn="ctr" latinLnBrk="1"/>
+                      <a:endParaRPr lang="ko-KR" altLang="en-US" dirty="0"/>
+                    </a:p>
+                  </a:txBody>
+                  <a:tcPr/>
+                </a:tc>
+              </a:tr>
+              <a:tr h="168713">
+                <a:tc>
+                  <a:txBody>
+                    <a:bodyPr/>
+                    <a:lstStyle/>
+                    <a:p>
+                      <a:pPr algn="ctr" latinLnBrk="1"/>
+                      <a:r>
+                        <a:rPr lang="en-US" altLang="ko-KR" sz="1800" dirty="0" smtClean="0"/>
+                        <a:t>100</a:t>
+                      </a:r>
+                      <a:endParaRPr lang="ko-KR" altLang="en-US" sz="1800" dirty="0"/>
+                    </a:p>
+                  </a:txBody>
+                  <a:tcPr/>
+                </a:tc>
+                <a:tc>
+                  <a:txBody>
+                    <a:bodyPr/>
+                    <a:lstStyle/>
+                    <a:p>
+                      <a:pPr algn="ctr" latinLnBrk="1"/>
+                      <a:r>
+                        <a:rPr lang="en-US" altLang="ko-KR" sz="1800" dirty="0" smtClean="0"/>
+                        <a:t>0x80...</a:t>
+                      </a:r>
+                      <a:endParaRPr lang="ko-KR" altLang="en-US" sz="1800" dirty="0"/>
+                    </a:p>
+                  </a:txBody>
+                  <a:tcPr/>
+                </a:tc>
+              </a:tr>
+              <a:tr h="168713">
+                <a:tc>
+                  <a:txBody>
+                    <a:bodyPr/>
+                    <a:lstStyle/>
+                    <a:p>
+                      <a:pPr algn="ctr" latinLnBrk="1"/>
+                      <a:r>
+                        <a:rPr lang="en-US" altLang="ko-KR" sz="1800" dirty="0" smtClean="0"/>
+                        <a:t>101</a:t>
+                      </a:r>
+                      <a:endParaRPr lang="ko-KR" altLang="en-US" sz="1800" dirty="0"/>
+                    </a:p>
+                  </a:txBody>
+                  <a:tcPr/>
+                </a:tc>
+                <a:tc>
+                  <a:txBody>
+                    <a:bodyPr/>
+                    <a:lstStyle/>
+                    <a:p>
+                      <a:pPr algn="ctr" latinLnBrk="1"/>
+                      <a:r>
+                        <a:rPr lang="en-US" altLang="ko-KR" sz="1800" dirty="0" smtClean="0"/>
+                        <a:t>0x80...</a:t>
+                      </a:r>
+                      <a:endParaRPr lang="ko-KR" altLang="en-US" sz="1800" dirty="0"/>
+                    </a:p>
+                  </a:txBody>
+                  <a:tcPr/>
+                </a:tc>
+              </a:tr>
+            </a:tbl>
+          </a:graphicData>
+        </a:graphic>
+      </p:graphicFrame>
     </p:spTree>
     <p:extLst>
       <p:ext uri="{BB962C8B-B14F-4D97-AF65-F5344CB8AC3E}">

</xml_diff>